<commit_message>
updated deep learning lecture
</commit_message>
<xml_diff>
--- a/lessons/02_deep_learning/deep_learning.pptx
+++ b/lessons/02_deep_learning/deep_learning.pptx
@@ -212,7 +212,7 @@
           <a:p>
             <a:fld id="{99D4630A-6D3B-4C97-A7DC-509EB0048625}" type="datetimeFigureOut">
               <a:rPr lang="it-CH" smtClean="0"/>
-              <a:t>23.06.25</a:t>
+              <a:t>29.06.25</a:t>
             </a:fld>
             <a:endParaRPr lang="it-CH"/>
           </a:p>
@@ -2293,7 +2293,7 @@
           <a:p>
             <a:fld id="{2A147C38-CC24-4E9D-9FE1-BE5105214113}" type="datetimeFigureOut">
               <a:rPr lang="it-CH" smtClean="0"/>
-              <a:t>23.06.25</a:t>
+              <a:t>29.06.25</a:t>
             </a:fld>
             <a:endParaRPr lang="it-CH"/>
           </a:p>
@@ -2493,7 +2493,7 @@
           <a:p>
             <a:fld id="{2A147C38-CC24-4E9D-9FE1-BE5105214113}" type="datetimeFigureOut">
               <a:rPr lang="it-CH" smtClean="0"/>
-              <a:t>23.06.25</a:t>
+              <a:t>29.06.25</a:t>
             </a:fld>
             <a:endParaRPr lang="it-CH"/>
           </a:p>
@@ -2703,7 +2703,7 @@
           <a:p>
             <a:fld id="{2A147C38-CC24-4E9D-9FE1-BE5105214113}" type="datetimeFigureOut">
               <a:rPr lang="it-CH" smtClean="0"/>
-              <a:t>23.06.25</a:t>
+              <a:t>29.06.25</a:t>
             </a:fld>
             <a:endParaRPr lang="it-CH"/>
           </a:p>
@@ -2903,7 +2903,7 @@
           <a:p>
             <a:fld id="{2A147C38-CC24-4E9D-9FE1-BE5105214113}" type="datetimeFigureOut">
               <a:rPr lang="it-CH" smtClean="0"/>
-              <a:t>23.06.25</a:t>
+              <a:t>29.06.25</a:t>
             </a:fld>
             <a:endParaRPr lang="it-CH"/>
           </a:p>
@@ -3179,7 +3179,7 @@
           <a:p>
             <a:fld id="{2A147C38-CC24-4E9D-9FE1-BE5105214113}" type="datetimeFigureOut">
               <a:rPr lang="it-CH" smtClean="0"/>
-              <a:t>23.06.25</a:t>
+              <a:t>29.06.25</a:t>
             </a:fld>
             <a:endParaRPr lang="it-CH"/>
           </a:p>
@@ -3447,7 +3447,7 @@
           <a:p>
             <a:fld id="{2A147C38-CC24-4E9D-9FE1-BE5105214113}" type="datetimeFigureOut">
               <a:rPr lang="it-CH" smtClean="0"/>
-              <a:t>23.06.25</a:t>
+              <a:t>29.06.25</a:t>
             </a:fld>
             <a:endParaRPr lang="it-CH"/>
           </a:p>
@@ -3862,7 +3862,7 @@
           <a:p>
             <a:fld id="{2A147C38-CC24-4E9D-9FE1-BE5105214113}" type="datetimeFigureOut">
               <a:rPr lang="it-CH" smtClean="0"/>
-              <a:t>23.06.25</a:t>
+              <a:t>29.06.25</a:t>
             </a:fld>
             <a:endParaRPr lang="it-CH"/>
           </a:p>
@@ -4004,7 +4004,7 @@
           <a:p>
             <a:fld id="{2A147C38-CC24-4E9D-9FE1-BE5105214113}" type="datetimeFigureOut">
               <a:rPr lang="it-CH" smtClean="0"/>
-              <a:t>23.06.25</a:t>
+              <a:t>29.06.25</a:t>
             </a:fld>
             <a:endParaRPr lang="it-CH"/>
           </a:p>
@@ -4117,7 +4117,7 @@
           <a:p>
             <a:fld id="{2A147C38-CC24-4E9D-9FE1-BE5105214113}" type="datetimeFigureOut">
               <a:rPr lang="it-CH" smtClean="0"/>
-              <a:t>23.06.25</a:t>
+              <a:t>29.06.25</a:t>
             </a:fld>
             <a:endParaRPr lang="it-CH"/>
           </a:p>
@@ -4430,7 +4430,7 @@
           <a:p>
             <a:fld id="{2A147C38-CC24-4E9D-9FE1-BE5105214113}" type="datetimeFigureOut">
               <a:rPr lang="it-CH" smtClean="0"/>
-              <a:t>23.06.25</a:t>
+              <a:t>29.06.25</a:t>
             </a:fld>
             <a:endParaRPr lang="it-CH"/>
           </a:p>
@@ -4719,7 +4719,7 @@
           <a:p>
             <a:fld id="{2A147C38-CC24-4E9D-9FE1-BE5105214113}" type="datetimeFigureOut">
               <a:rPr lang="it-CH" smtClean="0"/>
-              <a:t>23.06.25</a:t>
+              <a:t>29.06.25</a:t>
             </a:fld>
             <a:endParaRPr lang="it-CH"/>
           </a:p>
@@ -4962,7 +4962,7 @@
           <a:p>
             <a:fld id="{2A147C38-CC24-4E9D-9FE1-BE5105214113}" type="datetimeFigureOut">
               <a:rPr lang="it-CH" smtClean="0"/>
-              <a:t>23.06.25</a:t>
+              <a:t>29.06.25</a:t>
             </a:fld>
             <a:endParaRPr lang="it-CH"/>
           </a:p>
@@ -12946,7 +12946,7 @@
         </p:nvSpPr>
         <p:spPr>
           <a:xfrm>
-            <a:off x="375415" y="4224566"/>
+            <a:off x="375415" y="4061061"/>
             <a:ext cx="3987035" cy="369332"/>
           </a:xfrm>
           <a:prstGeom prst="rect">
@@ -12999,7 +12999,7 @@
         </p:blipFill>
         <p:spPr>
           <a:xfrm>
-            <a:off x="2593912" y="4173250"/>
+            <a:off x="2593912" y="4009745"/>
             <a:ext cx="2384316" cy="468476"/>
           </a:xfrm>
           <a:prstGeom prst="rect">
@@ -13021,7 +13021,7 @@
         </p:nvGrpSpPr>
         <p:grpSpPr>
           <a:xfrm>
-            <a:off x="352425" y="4886510"/>
+            <a:off x="352425" y="4723005"/>
             <a:ext cx="8568059" cy="1323612"/>
             <a:chOff x="352425" y="4886510"/>
             <a:chExt cx="8568059" cy="1323612"/>
@@ -13677,7 +13677,7 @@
           <a:lstStyle/>
           <a:p>
             <a:pPr algn="ctr"/>
-            <a:endParaRPr lang="en-GB"/>
+            <a:endParaRPr lang="en-GB" dirty="0"/>
           </a:p>
         </p:txBody>
       </p:sp>
@@ -14280,7 +14280,7 @@
           </p:nvPr>
         </p:nvPicPr>
         <p:blipFill>
-          <a:blip r:embed="rId14">
+          <a:blip r:embed="rId13">
             <a:extLst>
               <a:ext uri="{28A0092B-C50C-407E-A947-70E740481C1C}">
                 <a14:useLocalDpi xmlns:a14="http://schemas.microsoft.com/office/drawing/2010/main" val="0"/>
@@ -14320,7 +14320,7 @@
           </p:nvPr>
         </p:nvPicPr>
         <p:blipFill>
-          <a:blip r:embed="rId15">
+          <a:blip r:embed="rId14">
             <a:extLst>
               <a:ext uri="{28A0092B-C50C-407E-A947-70E740481C1C}">
                 <a14:useLocalDpi xmlns:a14="http://schemas.microsoft.com/office/drawing/2010/main" val="0"/>
@@ -14360,7 +14360,7 @@
           </p:nvPr>
         </p:nvPicPr>
         <p:blipFill>
-          <a:blip r:embed="rId16">
+          <a:blip r:embed="rId15">
             <a:extLst>
               <a:ext uri="{28A0092B-C50C-407E-A947-70E740481C1C}">
                 <a14:useLocalDpi xmlns:a14="http://schemas.microsoft.com/office/drawing/2010/main" val="0"/>
@@ -14441,7 +14441,7 @@
           </p:nvPr>
         </p:nvPicPr>
         <p:blipFill>
-          <a:blip r:embed="rId17">
+          <a:blip r:embed="rId16">
             <a:extLst>
               <a:ext uri="{28A0092B-C50C-407E-A947-70E740481C1C}">
                 <a14:useLocalDpi xmlns:a14="http://schemas.microsoft.com/office/drawing/2010/main" val="0"/>
@@ -14522,7 +14522,7 @@
           </p:nvPr>
         </p:nvPicPr>
         <p:blipFill>
-          <a:blip r:embed="rId18">
+          <a:blip r:embed="rId17">
             <a:extLst>
               <a:ext uri="{28A0092B-C50C-407E-A947-70E740481C1C}">
                 <a14:useLocalDpi xmlns:a14="http://schemas.microsoft.com/office/drawing/2010/main" val="0"/>
@@ -14562,7 +14562,7 @@
           </p:nvPr>
         </p:nvPicPr>
         <p:blipFill>
-          <a:blip r:embed="rId19">
+          <a:blip r:embed="rId18">
             <a:extLst>
               <a:ext uri="{28A0092B-C50C-407E-A947-70E740481C1C}">
                 <a14:useLocalDpi xmlns:a14="http://schemas.microsoft.com/office/drawing/2010/main" val="0"/>
@@ -14626,10 +14626,10 @@
       </p:cxnSp>
       <p:pic>
         <p:nvPicPr>
-          <p:cNvPr id="62" name="Immagine 61" descr="\documentclass{article}&#10;\usepackage{amsmath}&#10;\pagestyle{empty}&#10;\usepackage{bm}&#10;\newcommand{\pmeas}{{\bf p}}&#10;\newcommand{\umeas}{{\bf u}}&#10;\newcommand{\ymeas}{{\bf y}}&#10;\newcommand{\yo}{{\bf y}^{\rm o} }&#10;&#10;\newcommand{\nin}{n_u} &#10;\newcommand{\ny}{n_y} &#10;\newcommand{\nx}{n_x} &#10;\newcommand{\np}{n_p} &#10;\begin{document}&#10;&#10; \begin{align*}&#10; \delta_i^L = \frac{\partial \ell}{\partial z_i^{L}} =   \frac{\partial \ell}{\partial z^{L+1}}  \frac{\partial z^{L+1}}{\partial z_i^{L}} =   \delta^{L+1}   \frac{\partial z^{L+1}}{\partial z_i^{L}}&#10; \end{align*}&#10;&#10;&#10;&#10;&#10;\end{document}" title="IguanaTex Bitmap Display">
-            <a:extLst>
-              <a:ext uri="{FF2B5EF4-FFF2-40B4-BE49-F238E27FC236}">
-                <a16:creationId xmlns:a16="http://schemas.microsoft.com/office/drawing/2014/main" id="{BB8E780B-9EE8-0D41-1149-127CE1194DA3}"/>
+          <p:cNvPr id="12" name="Picture 11" descr="\documentclass{article}&#10;\usepackage{amsmath}&#10;\pagestyle{empty}&#10;\usepackage{bm}&#10;\newcommand{\pmeas}{{\bf p}}&#10;\newcommand{\umeas}{{\bf u}}&#10;\newcommand{\ymeas}{{\bf y}}&#10;\newcommand{\yo}{{\bf y}^{\rm o} }&#10;&#10;\newcommand{\nin}{n_u} &#10;\newcommand{\ny}{n_y} &#10;\newcommand{\nx}{n_x} &#10;\newcommand{\np}{n_p} &#10;\begin{document}&#10;&#10; \begin{align*}&#10; \delta^L = \frac{\partial \ell}{\partial z^{L+1}}  \frac{\partial z^{L+1}}{\partial z^{L}} =   \delta^{L+1}   \frac{\partial z^{L+1}}{\partial z^{L}}&#10; \end{align*}&#10;&#10;&#10;&#10;&#10;\end{document}" title="IguanaTex Bitmap Display">
+            <a:extLst>
+              <a:ext uri="{FF2B5EF4-FFF2-40B4-BE49-F238E27FC236}">
+                <a16:creationId xmlns:a16="http://schemas.microsoft.com/office/drawing/2014/main" id="{2ED1A0AA-4D6D-C155-DE90-AB160EEB121B}"/>
               </a:ext>
             </a:extLst>
           </p:cNvPr>
@@ -14643,13 +14643,7 @@
           </p:nvPr>
         </p:nvPicPr>
         <p:blipFill>
-          <a:blip r:embed="rId20">
-            <a:extLst>
-              <a:ext uri="{28A0092B-C50C-407E-A947-70E740481C1C}">
-                <a14:useLocalDpi xmlns:a14="http://schemas.microsoft.com/office/drawing/2010/main" val="0"/>
-              </a:ext>
-            </a:extLst>
-          </a:blip>
+          <a:blip r:embed="rId19"/>
           <a:stretch>
             <a:fillRect/>
           </a:stretch>
@@ -14657,7 +14651,7 @@
         <p:spPr>
           <a:xfrm>
             <a:off x="7248555" y="1349340"/>
-            <a:ext cx="3601551" cy="509074"/>
+            <a:ext cx="2946397" cy="447040"/>
           </a:xfrm>
           <a:prstGeom prst="rect">
             <a:avLst/>
@@ -14666,10 +14660,10 @@
       </p:pic>
       <p:pic>
         <p:nvPicPr>
-          <p:cNvPr id="6" name="Immagine 5" descr="\documentclass{article}&#10;\usepackage{amsmath}&#10;\pagestyle{empty}&#10;\usepackage{bm}&#10;\newcommand{\pmeas}{{\bf p}}&#10;\newcommand{\umeas}{{\bf u}}&#10;\newcommand{\ymeas}{{\bf y}}&#10;\newcommand{\yo}{{\bf y}^{\rm o} }&#10;&#10;\newcommand{\nin}{n_u} &#10;\newcommand{\ny}{n_y} &#10;\newcommand{\nx}{n_x} &#10;\newcommand{\np}{n_p} &#10;\begin{document}&#10;&#10; \begin{align*}&#10;  \frac{\partial \ell}{\partial \theta_L} = \sum_{i=1}^{n_{L+1}}   \frac{\partial \ell}{\partial z_i^{L+1}}  \frac{\partial z_i^{L+1}}{\partial \theta_L} =  \sum_{i=1}^{n_{L+1}}\delta_i^{L+1}   \frac{\partial z_i^{L+1}}{\partial \theta_L}&#10; \end{align*}&#10;&#10;&#10;&#10;&#10;\end{document}" title="IguanaTex Bitmap Display">
-            <a:extLst>
-              <a:ext uri="{FF2B5EF4-FFF2-40B4-BE49-F238E27FC236}">
-                <a16:creationId xmlns:a16="http://schemas.microsoft.com/office/drawing/2014/main" id="{F2FCB4A6-07F7-FDD0-2ECA-15D0949FC747}"/>
+          <p:cNvPr id="26" name="Picture 25" descr="\documentclass{article}&#10;\usepackage{amsmath}&#10;\pagestyle{empty}&#10;\usepackage{bm}&#10;\newcommand{\pmeas}{{\bf p}}&#10;\newcommand{\umeas}{{\bf u}}&#10;\newcommand{\ymeas}{{\bf y}}&#10;\newcommand{\yo}{{\bf y}^{\rm o} }&#10;&#10;\newcommand{\nin}{n_u} &#10;\newcommand{\ny}{n_y} &#10;\newcommand{\nx}{n_x} &#10;\newcommand{\np}{n_p} &#10;\begin{document}&#10;&#10; \begin{align*}&#10;  \frac{\partial \ell}{\partial \theta_L} = &#10;\frac{\partial \ell}{\partial z^{L+1}}  \frac{\partial z^{L+1}}&#10;{\partial \theta_L} &#10;= \delta^{L+1} \frac{\partial z^{L+1}}{\partial \theta_L}&#10; \end{align*}&#10;&#10;&#10;&#10;&#10;\end{document}" title="IguanaTex Bitmap Display">
+            <a:extLst>
+              <a:ext uri="{FF2B5EF4-FFF2-40B4-BE49-F238E27FC236}">
+                <a16:creationId xmlns:a16="http://schemas.microsoft.com/office/drawing/2014/main" id="{93F0BC60-0598-9254-38FF-FAB1FFA84E07}"/>
               </a:ext>
             </a:extLst>
           </p:cNvPr>
@@ -14683,13 +14677,7 @@
           </p:nvPr>
         </p:nvPicPr>
         <p:blipFill>
-          <a:blip r:embed="rId21">
-            <a:extLst>
-              <a:ext uri="{28A0092B-C50C-407E-A947-70E740481C1C}">
-                <a14:useLocalDpi xmlns:a14="http://schemas.microsoft.com/office/drawing/2010/main" val="0"/>
-              </a:ext>
-            </a:extLst>
-          </a:blip>
+          <a:blip r:embed="rId20"/>
           <a:stretch>
             <a:fillRect/>
           </a:stretch>
@@ -14697,7 +14685,7 @@
         <p:spPr>
           <a:xfrm>
             <a:off x="7178703" y="2068219"/>
-            <a:ext cx="3915332" cy="574903"/>
+            <a:ext cx="3088635" cy="487680"/>
           </a:xfrm>
           <a:prstGeom prst="rect">
             <a:avLst/>
@@ -15382,40 +15370,73 @@
           </a:prstGeom>
         </p:spPr>
       </p:pic>
+      <p:sp>
+        <p:nvSpPr>
+          <p:cNvPr id="5" name="CasellaDiTesto 71">
+            <a:extLst>
+              <a:ext uri="{FF2B5EF4-FFF2-40B4-BE49-F238E27FC236}">
+                <a16:creationId xmlns:a16="http://schemas.microsoft.com/office/drawing/2014/main" id="{09508ED4-63D0-20A3-DA94-BE2987FBE190}"/>
+              </a:ext>
+            </a:extLst>
+          </p:cNvPr>
+          <p:cNvSpPr txBox="1"/>
+          <p:nvPr/>
+        </p:nvSpPr>
+        <p:spPr>
+          <a:xfrm>
+            <a:off x="495766" y="5807855"/>
+            <a:ext cx="11244991" cy="369332"/>
+          </a:xfrm>
+          <a:prstGeom prst="rect">
+            <a:avLst/>
+          </a:prstGeom>
+          <a:noFill/>
+        </p:spPr>
+        <p:txBody>
+          <a:bodyPr wrap="square" rtlCol="0">
+            <a:spAutoFit/>
+          </a:bodyPr>
+          <a:lstStyle/>
+          <a:p>
+            <a:r>
+              <a:rPr lang="en-GB" dirty="0"/>
+              <a:t>Algorithm: reverse-mode automatic differentiation. Application to neural network training is called </a:t>
+            </a:r>
+            <a:r>
+              <a:rPr lang="en-GB" b="1" dirty="0"/>
+              <a:t>back-propagation</a:t>
+            </a:r>
+            <a:r>
+              <a:rPr lang="en-GB" dirty="0"/>
+              <a:t>.</a:t>
+            </a:r>
+          </a:p>
+        </p:txBody>
+      </p:sp>
       <p:pic>
         <p:nvPicPr>
-          <p:cNvPr id="24" name="Immagine 23" descr="\documentclass{article}&#10;\usepackage{amsmath}&#10;\pagestyle{empty}&#10;\usepackage{bm}&#10;\newcommand{\pmeas}{{\bf p}}&#10;\newcommand{\umeas}{{\bf u}}&#10;\newcommand{\ymeas}{{\bf y}}&#10;\newcommand{\yo}{{\bf y}^{\rm o} }&#10;&#10;\newcommand{\nin}{n_u} &#10;\newcommand{\ny}{n_y} &#10;\newcommand{\nx}{n_x} &#10;\newcommand{\np}{n_p} &#10;\begin{document}&#10;&#10; \begin{align*}&#10;  \frac{\partial z_i^{L+1}}{\partial W} = \left[\begin{array}{l}0 \\ \vdots \\ z^{L'} \\0 \end{array} \right] \rightarrow&#10;  \frac{\partial \ell}{\partial W}   =  \left[\begin{array}{l}\delta_1^{L+1}z^{L'} \\ \vdots \\ \delta_{n_L}^{L+1}z^{L'} \end{array} \right]&#10; \end{align*}&#10;&#10;&#10;&#10;&#10;\end{document}" title="IguanaTex Bitmap Display">
-            <a:extLst>
-              <a:ext uri="{FF2B5EF4-FFF2-40B4-BE49-F238E27FC236}">
-                <a16:creationId xmlns:a16="http://schemas.microsoft.com/office/drawing/2014/main" id="{3220627D-FED4-45AA-972B-14B2A11997E9}"/>
+          <p:cNvPr id="11" name="Picture 10">
+            <a:extLst>
+              <a:ext uri="{FF2B5EF4-FFF2-40B4-BE49-F238E27FC236}">
+                <a16:creationId xmlns:a16="http://schemas.microsoft.com/office/drawing/2014/main" id="{0A5A4D03-0A8D-31A9-12E8-0D5FE4EC0176}"/>
               </a:ext>
             </a:extLst>
           </p:cNvPr>
           <p:cNvPicPr>
             <a:picLocks noChangeAspect="1"/>
           </p:cNvPicPr>
-          <p:nvPr>
-            <p:custDataLst>
-              <p:tags r:id="rId11"/>
-            </p:custDataLst>
-          </p:nvPr>
+          <p:nvPr/>
         </p:nvPicPr>
         <p:blipFill>
-          <a:blip r:embed="rId25">
-            <a:extLst>
-              <a:ext uri="{28A0092B-C50C-407E-A947-70E740481C1C}">
-                <a14:useLocalDpi xmlns:a14="http://schemas.microsoft.com/office/drawing/2010/main" val="0"/>
-              </a:ext>
-            </a:extLst>
-          </a:blip>
+          <a:blip r:embed="rId25"/>
           <a:stretch>
             <a:fillRect/>
           </a:stretch>
         </p:blipFill>
         <p:spPr>
           <a:xfrm>
-            <a:off x="3866552" y="5429938"/>
-            <a:ext cx="3673964" cy="1093485"/>
+            <a:off x="8401049" y="3977327"/>
+            <a:ext cx="2451983" cy="1730315"/>
           </a:xfrm>
           <a:prstGeom prst="rect">
             <a:avLst/>
@@ -15466,7 +15487,7 @@
                                           </p:stCondLst>
                                         </p:cTn>
                                         <p:tgtEl>
-                                          <p:spTgt spid="6"/>
+                                          <p:spTgt spid="26"/>
                                         </p:tgtEl>
                                         <p:attrNameLst>
                                           <p:attrName>style.visibility</p:attrName>
@@ -15722,21 +15743,66 @@
                                   </p:childTnLst>
                                 </p:cTn>
                               </p:par>
+                            </p:childTnLst>
+                          </p:cTn>
+                        </p:par>
+                      </p:childTnLst>
+                    </p:cTn>
+                  </p:par>
+                  <p:par>
+                    <p:cTn id="27" fill="hold">
+                      <p:stCondLst>
+                        <p:cond delay="indefinite"/>
+                      </p:stCondLst>
+                      <p:childTnLst>
+                        <p:par>
+                          <p:cTn id="28" fill="hold">
+                            <p:stCondLst>
+                              <p:cond delay="0"/>
+                            </p:stCondLst>
+                            <p:childTnLst>
                               <p:par>
-                                <p:cTn id="27" presetID="1" presetClass="entr" presetSubtype="0" fill="hold" nodeType="withEffect">
+                                <p:cTn id="29" presetID="1" presetClass="entr" presetSubtype="0" fill="hold" grpId="1" nodeType="clickEffect">
                                   <p:stCondLst>
                                     <p:cond delay="0"/>
                                   </p:stCondLst>
                                   <p:childTnLst>
                                     <p:set>
                                       <p:cBhvr>
-                                        <p:cTn id="28" dur="1" fill="hold">
+                                        <p:cTn id="30" dur="1" fill="hold">
                                           <p:stCondLst>
                                             <p:cond delay="0"/>
                                           </p:stCondLst>
                                         </p:cTn>
                                         <p:tgtEl>
-                                          <p:spTgt spid="24"/>
+                                          <p:spTgt spid="5"/>
+                                        </p:tgtEl>
+                                        <p:attrNameLst>
+                                          <p:attrName>style.visibility</p:attrName>
+                                        </p:attrNameLst>
+                                      </p:cBhvr>
+                                      <p:to>
+                                        <p:strVal val="visible"/>
+                                      </p:to>
+                                    </p:set>
+                                  </p:childTnLst>
+                                </p:cTn>
+                              </p:par>
+                              <p:par>
+                                <p:cTn id="31" presetID="1" presetClass="entr" presetSubtype="0" fill="hold" nodeType="withEffect">
+                                  <p:stCondLst>
+                                    <p:cond delay="0"/>
+                                  </p:stCondLst>
+                                  <p:childTnLst>
+                                    <p:set>
+                                      <p:cBhvr>
+                                        <p:cTn id="32" dur="1" fill="hold">
+                                          <p:stCondLst>
+                                            <p:cond delay="0"/>
+                                          </p:stCondLst>
+                                        </p:cTn>
+                                        <p:tgtEl>
+                                          <p:spTgt spid="11"/>
                                         </p:tgtEl>
                                         <p:attrNameLst>
                                           <p:attrName>style.visibility</p:attrName>
@@ -15782,6 +15848,7 @@
       <p:bldP spid="14" grpId="0"/>
       <p:bldP spid="17" grpId="0"/>
       <p:bldP spid="18" grpId="0"/>
+      <p:bldP spid="5" grpId="1"/>
     </p:bldLst>
   </p:timing>
 </p:sld>
@@ -16158,8 +16225,8 @@
           </a:fontRef>
         </p:style>
       </p:cxnSp>
-      <mc:AlternateContent xmlns:mc="http://schemas.openxmlformats.org/markup-compatibility/2006" xmlns:a14="http://schemas.microsoft.com/office/drawing/2010/main">
-        <mc:Choice Requires="a14">
+      <mc:AlternateContent xmlns:mc="http://schemas.openxmlformats.org/markup-compatibility/2006">
+        <mc:Choice xmlns:a14="http://schemas.microsoft.com/office/drawing/2010/main" Requires="a14">
           <p:sp>
             <p:nvSpPr>
               <p:cNvPr id="2" name="CasellaDiTesto 6">
@@ -16643,10 +16710,11 @@
                 <a14:m>
                   <m:oMath xmlns:m="http://schemas.openxmlformats.org/officeDocument/2006/math">
                     <m:r>
-                      <a:rPr lang="it-CH" sz="2000" i="1" smtClean="0">
+                      <a:rPr lang="it-CH" sz="2000" i="1" dirty="0" smtClean="0">
                         <a:latin typeface="Cambria Math" panose="02040503050406030204" pitchFamily="18" charset="0"/>
+                        <a:ea typeface="Cambria Math" panose="02040503050406030204" pitchFamily="18" charset="0"/>
                       </a:rPr>
-                      <m:t>𝐿</m:t>
+                      <m:t>ℒ</m:t>
                     </m:r>
                     <m:r>
                       <a:rPr lang="it-CH" sz="2000" i="1" smtClean="0">
@@ -16902,7 +16970,7 @@
             </p:txBody>
           </p:sp>
         </mc:Choice>
-        <mc:Fallback xmlns="">
+        <mc:Fallback>
           <p:sp>
             <p:nvSpPr>
               <p:cNvPr id="2" name="CasellaDiTesto 6">
@@ -17185,8 +17253,8 @@
           </a:prstGeom>
         </p:spPr>
       </p:pic>
-      <mc:AlternateContent xmlns:mc="http://schemas.openxmlformats.org/markup-compatibility/2006" xmlns:a14="http://schemas.microsoft.com/office/drawing/2010/main">
-        <mc:Choice Requires="a14">
+      <mc:AlternateContent xmlns:mc="http://schemas.openxmlformats.org/markup-compatibility/2006">
+        <mc:Choice xmlns:a14="http://schemas.microsoft.com/office/drawing/2010/main" Requires="a14">
           <p:sp>
             <p:nvSpPr>
               <p:cNvPr id="5" name="CasellaDiTesto 9">
@@ -17309,10 +17377,11 @@
                         </m:fName>
                         <m:e>
                           <m:r>
-                            <a:rPr lang="it-CH" sz="2800" i="1">
+                            <a:rPr lang="it-CH" sz="2800" i="1" dirty="0">
                               <a:latin typeface="Cambria Math" panose="02040503050406030204" pitchFamily="18" charset="0"/>
+                              <a:ea typeface="Cambria Math" panose="02040503050406030204" pitchFamily="18" charset="0"/>
                             </a:rPr>
-                            <m:t>𝐿</m:t>
+                            <m:t>ℒ</m:t>
                           </m:r>
                           <m:r>
                             <a:rPr lang="it-CH" sz="2800" i="1">
@@ -17350,7 +17419,7 @@
             </p:txBody>
           </p:sp>
         </mc:Choice>
-        <mc:Fallback xmlns="">
+        <mc:Fallback>
           <p:sp>
             <p:nvSpPr>
               <p:cNvPr id="5" name="CasellaDiTesto 9">
@@ -20365,7 +20434,7 @@
           </p:nvPr>
         </p:nvPicPr>
         <p:blipFill>
-          <a:blip r:embed="rId8">
+          <a:blip r:embed="rId9">
             <a:extLst>
               <a:ext uri="{28A0092B-C50C-407E-A947-70E740481C1C}">
                 <a14:useLocalDpi xmlns:a14="http://schemas.microsoft.com/office/drawing/2010/main" val="0"/>
@@ -20378,7 +20447,7 @@
         </p:blipFill>
         <p:spPr>
           <a:xfrm>
-            <a:off x="7543723" y="1231167"/>
+            <a:off x="7543723" y="1225111"/>
             <a:ext cx="3966321" cy="763494"/>
           </a:xfrm>
           <a:prstGeom prst="rect">
@@ -20405,7 +20474,7 @@
           </p:nvPr>
         </p:nvPicPr>
         <p:blipFill>
-          <a:blip r:embed="rId9">
+          <a:blip r:embed="rId10">
             <a:extLst>
               <a:ext uri="{28A0092B-C50C-407E-A947-70E740481C1C}">
                 <a14:useLocalDpi xmlns:a14="http://schemas.microsoft.com/office/drawing/2010/main" val="0"/>
@@ -20428,10 +20497,10 @@
       </p:pic>
       <p:grpSp>
         <p:nvGrpSpPr>
-          <p:cNvPr id="85" name="Gruppo 84">
-            <a:extLst>
-              <a:ext uri="{FF2B5EF4-FFF2-40B4-BE49-F238E27FC236}">
-                <a16:creationId xmlns:a16="http://schemas.microsoft.com/office/drawing/2014/main" id="{4ED17D7A-159A-9B9C-4DCA-3422D3AB0399}"/>
+          <p:cNvPr id="23" name="Gruppo 22">
+            <a:extLst>
+              <a:ext uri="{FF2B5EF4-FFF2-40B4-BE49-F238E27FC236}">
+                <a16:creationId xmlns:a16="http://schemas.microsoft.com/office/drawing/2014/main" id="{9C4F3B65-0214-331F-C1A8-CFB83CDE8A95}"/>
               </a:ext>
             </a:extLst>
           </p:cNvPr>
@@ -20441,369 +20510,131 @@
         <p:grpSpPr>
           <a:xfrm>
             <a:off x="310395" y="1392760"/>
-            <a:ext cx="6065393" cy="3264596"/>
-            <a:chOff x="202057" y="1256405"/>
-            <a:chExt cx="6585302" cy="3497937"/>
+            <a:ext cx="6065393" cy="3570022"/>
+            <a:chOff x="5849668" y="2042248"/>
+            <a:chExt cx="6585302" cy="3825193"/>
           </a:xfrm>
         </p:grpSpPr>
-        <p:grpSp>
-          <p:nvGrpSpPr>
-            <p:cNvPr id="23" name="Gruppo 22">
+        <p:pic>
+          <p:nvPicPr>
+            <p:cNvPr id="7" name="Immagine 6">
               <a:extLst>
                 <a:ext uri="{FF2B5EF4-FFF2-40B4-BE49-F238E27FC236}">
-                  <a16:creationId xmlns:a16="http://schemas.microsoft.com/office/drawing/2014/main" id="{9C4F3B65-0214-331F-C1A8-CFB83CDE8A95}"/>
+                  <a16:creationId xmlns:a16="http://schemas.microsoft.com/office/drawing/2014/main" id="{FC644E57-EAEC-6A7C-C8AA-CB3F63F2B0A8}"/>
                 </a:ext>
               </a:extLst>
             </p:cNvPr>
-            <p:cNvGrpSpPr/>
+            <p:cNvPicPr>
+              <a:picLocks noChangeAspect="1"/>
+            </p:cNvPicPr>
             <p:nvPr/>
-          </p:nvGrpSpPr>
-          <p:grpSpPr>
+          </p:nvPicPr>
+          <p:blipFill>
+            <a:blip r:embed="rId11"/>
+            <a:stretch>
+              <a:fillRect/>
+            </a:stretch>
+          </p:blipFill>
+          <p:spPr>
             <a:xfrm>
-              <a:off x="202057" y="1256405"/>
-              <a:ext cx="6585302" cy="3497937"/>
-              <a:chOff x="5849668" y="2042248"/>
-              <a:chExt cx="6585302" cy="3497937"/>
+              <a:off x="6519862" y="2042248"/>
+              <a:ext cx="5319713" cy="2925434"/>
             </a:xfrm>
-          </p:grpSpPr>
-          <p:pic>
-            <p:nvPicPr>
-              <p:cNvPr id="7" name="Immagine 6">
-                <a:extLst>
-                  <a:ext uri="{FF2B5EF4-FFF2-40B4-BE49-F238E27FC236}">
-                    <a16:creationId xmlns:a16="http://schemas.microsoft.com/office/drawing/2014/main" id="{FC644E57-EAEC-6A7C-C8AA-CB3F63F2B0A8}"/>
-                  </a:ext>
-                </a:extLst>
-              </p:cNvPr>
-              <p:cNvPicPr>
-                <a:picLocks noChangeAspect="1"/>
-              </p:cNvPicPr>
-              <p:nvPr/>
-            </p:nvPicPr>
-            <p:blipFill>
-              <a:blip r:embed="rId10"/>
-              <a:stretch>
-                <a:fillRect/>
-              </a:stretch>
-            </p:blipFill>
-            <p:spPr>
-              <a:xfrm>
-                <a:off x="6519862" y="2042248"/>
-                <a:ext cx="5319713" cy="2925434"/>
-              </a:xfrm>
-              <a:prstGeom prst="rect">
-                <a:avLst/>
-              </a:prstGeom>
-            </p:spPr>
-          </p:pic>
-          <p:sp>
-            <p:nvSpPr>
-              <p:cNvPr id="9" name="Parentesi graffa aperta 8">
-                <a:extLst>
-                  <a:ext uri="{FF2B5EF4-FFF2-40B4-BE49-F238E27FC236}">
-                    <a16:creationId xmlns:a16="http://schemas.microsoft.com/office/drawing/2014/main" id="{89F266DD-16EF-ABBF-707D-FA85307C345B}"/>
-                  </a:ext>
-                </a:extLst>
-              </p:cNvPr>
-              <p:cNvSpPr/>
-              <p:nvPr/>
-            </p:nvSpPr>
-            <p:spPr>
-              <a:xfrm>
-                <a:off x="6173056" y="2133603"/>
-                <a:ext cx="456344" cy="2044332"/>
-              </a:xfrm>
-              <a:prstGeom prst="leftBrace">
-                <a:avLst/>
-              </a:prstGeom>
-              <a:ln>
-                <a:solidFill>
-                  <a:srgbClr val="FF0000"/>
-                </a:solidFill>
-              </a:ln>
-            </p:spPr>
-            <p:style>
-              <a:lnRef idx="1">
-                <a:schemeClr val="accent1"/>
-              </a:lnRef>
-              <a:fillRef idx="0">
-                <a:schemeClr val="accent1"/>
-              </a:fillRef>
-              <a:effectRef idx="0">
-                <a:schemeClr val="accent1"/>
-              </a:effectRef>
-              <a:fontRef idx="minor">
-                <a:schemeClr val="tx1"/>
-              </a:fontRef>
-            </p:style>
-            <p:txBody>
-              <a:bodyPr rtlCol="0" anchor="ctr"/>
-              <a:lstStyle/>
-              <a:p>
-                <a:pPr algn="ctr"/>
-                <a:endParaRPr lang="en-GB"/>
-              </a:p>
-            </p:txBody>
-          </p:sp>
-          <p:sp>
-            <p:nvSpPr>
-              <p:cNvPr id="10" name="CasellaDiTesto 9">
-                <a:extLst>
-                  <a:ext uri="{FF2B5EF4-FFF2-40B4-BE49-F238E27FC236}">
-                    <a16:creationId xmlns:a16="http://schemas.microsoft.com/office/drawing/2014/main" id="{AC282CFD-67ED-525E-35DB-67DAEA5394FA}"/>
-                  </a:ext>
-                </a:extLst>
-              </p:cNvPr>
-              <p:cNvSpPr txBox="1"/>
-              <p:nvPr/>
-            </p:nvSpPr>
-            <p:spPr>
-              <a:xfrm rot="16200000">
-                <a:off x="5354027" y="2986492"/>
-                <a:ext cx="1329836" cy="338554"/>
-              </a:xfrm>
-              <a:prstGeom prst="rect">
-                <a:avLst/>
-              </a:prstGeom>
-              <a:noFill/>
-            </p:spPr>
-            <p:txBody>
-              <a:bodyPr wrap="square" rtlCol="0">
-                <a:spAutoFit/>
-              </a:bodyPr>
-              <a:lstStyle/>
-              <a:p>
-                <a:r>
-                  <a:rPr lang="en-GB" sz="1600" dirty="0"/>
-                  <a:t>Input  layer</a:t>
-                </a:r>
-              </a:p>
-            </p:txBody>
-          </p:sp>
-          <p:sp>
-            <p:nvSpPr>
-              <p:cNvPr id="11" name="CasellaDiTesto 10">
-                <a:extLst>
-                  <a:ext uri="{FF2B5EF4-FFF2-40B4-BE49-F238E27FC236}">
-                    <a16:creationId xmlns:a16="http://schemas.microsoft.com/office/drawing/2014/main" id="{4DC9E99E-F6E2-1567-380A-4A2DFA531764}"/>
-                  </a:ext>
-                </a:extLst>
-              </p:cNvPr>
-              <p:cNvSpPr txBox="1"/>
-              <p:nvPr/>
-            </p:nvSpPr>
-            <p:spPr>
-              <a:xfrm>
-                <a:off x="8053422" y="5201631"/>
-                <a:ext cx="1578941" cy="338554"/>
-              </a:xfrm>
-              <a:prstGeom prst="rect">
-                <a:avLst/>
-              </a:prstGeom>
-              <a:noFill/>
-            </p:spPr>
-            <p:txBody>
-              <a:bodyPr wrap="square" rtlCol="0">
-                <a:spAutoFit/>
-              </a:bodyPr>
-              <a:lstStyle/>
-              <a:p>
-                <a:r>
-                  <a:rPr lang="en-GB" sz="1600" dirty="0"/>
-                  <a:t>Layer 2</a:t>
-                </a:r>
-              </a:p>
-            </p:txBody>
-          </p:sp>
-          <p:sp>
-            <p:nvSpPr>
-              <p:cNvPr id="13" name="Parentesi graffa aperta 12">
-                <a:extLst>
-                  <a:ext uri="{FF2B5EF4-FFF2-40B4-BE49-F238E27FC236}">
-                    <a16:creationId xmlns:a16="http://schemas.microsoft.com/office/drawing/2014/main" id="{B22AB3A7-03A9-F24F-B408-B6CC71A45635}"/>
-                  </a:ext>
-                </a:extLst>
-              </p:cNvPr>
-              <p:cNvSpPr/>
-              <p:nvPr/>
-            </p:nvSpPr>
-            <p:spPr>
-              <a:xfrm rot="16200000">
-                <a:off x="8262730" y="4777371"/>
-                <a:ext cx="369333" cy="604745"/>
-              </a:xfrm>
-              <a:prstGeom prst="leftBrace">
-                <a:avLst/>
-              </a:prstGeom>
-              <a:ln>
-                <a:solidFill>
-                  <a:srgbClr val="00B050"/>
-                </a:solidFill>
-              </a:ln>
-            </p:spPr>
-            <p:style>
-              <a:lnRef idx="1">
-                <a:schemeClr val="accent1"/>
-              </a:lnRef>
-              <a:fillRef idx="0">
-                <a:schemeClr val="accent1"/>
-              </a:fillRef>
-              <a:effectRef idx="0">
-                <a:schemeClr val="accent1"/>
-              </a:effectRef>
-              <a:fontRef idx="minor">
-                <a:schemeClr val="tx1"/>
-              </a:fontRef>
-            </p:style>
-            <p:txBody>
-              <a:bodyPr rtlCol="0" anchor="ctr"/>
-              <a:lstStyle/>
-              <a:p>
-                <a:pPr algn="ctr"/>
-                <a:endParaRPr lang="en-GB" dirty="0"/>
-              </a:p>
-            </p:txBody>
-          </p:sp>
-          <p:sp>
-            <p:nvSpPr>
-              <p:cNvPr id="18" name="Parentesi graffa aperta 17">
-                <a:extLst>
-                  <a:ext uri="{FF2B5EF4-FFF2-40B4-BE49-F238E27FC236}">
-                    <a16:creationId xmlns:a16="http://schemas.microsoft.com/office/drawing/2014/main" id="{9318CFA2-7959-4CFF-CC00-DB1DE69FF68D}"/>
-                  </a:ext>
-                </a:extLst>
-              </p:cNvPr>
-              <p:cNvSpPr/>
-              <p:nvPr/>
-            </p:nvSpPr>
-            <p:spPr>
-              <a:xfrm rot="16200000">
-                <a:off x="9767680" y="4071305"/>
-                <a:ext cx="369333" cy="604745"/>
-              </a:xfrm>
-              <a:prstGeom prst="leftBrace">
-                <a:avLst/>
-              </a:prstGeom>
-              <a:ln>
-                <a:solidFill>
-                  <a:srgbClr val="0070C0"/>
-                </a:solidFill>
-              </a:ln>
-            </p:spPr>
-            <p:style>
-              <a:lnRef idx="1">
-                <a:schemeClr val="accent1"/>
-              </a:lnRef>
-              <a:fillRef idx="0">
-                <a:schemeClr val="accent1"/>
-              </a:fillRef>
-              <a:effectRef idx="0">
-                <a:schemeClr val="accent1"/>
-              </a:effectRef>
-              <a:fontRef idx="minor">
-                <a:schemeClr val="tx1"/>
-              </a:fontRef>
-            </p:style>
-            <p:txBody>
-              <a:bodyPr rtlCol="0" anchor="ctr"/>
-              <a:lstStyle/>
-              <a:p>
-                <a:pPr algn="ctr"/>
-                <a:endParaRPr lang="en-GB" dirty="0"/>
-              </a:p>
-            </p:txBody>
-          </p:sp>
-          <p:sp>
-            <p:nvSpPr>
-              <p:cNvPr id="20" name="CasellaDiTesto 19">
-                <a:extLst>
-                  <a:ext uri="{FF2B5EF4-FFF2-40B4-BE49-F238E27FC236}">
-                    <a16:creationId xmlns:a16="http://schemas.microsoft.com/office/drawing/2014/main" id="{4EE6F2D4-C335-AED2-9CF8-CC3B156725A7}"/>
-                  </a:ext>
-                </a:extLst>
-              </p:cNvPr>
-              <p:cNvSpPr txBox="1"/>
-              <p:nvPr/>
-            </p:nvSpPr>
-            <p:spPr>
-              <a:xfrm>
-                <a:off x="10856029" y="4008658"/>
-                <a:ext cx="1578941" cy="338554"/>
-              </a:xfrm>
-              <a:prstGeom prst="rect">
-                <a:avLst/>
-              </a:prstGeom>
-              <a:noFill/>
-            </p:spPr>
-            <p:txBody>
-              <a:bodyPr wrap="square" rtlCol="0">
-                <a:spAutoFit/>
-              </a:bodyPr>
-              <a:lstStyle/>
-              <a:p>
-                <a:r>
-                  <a:rPr lang="en-GB" sz="1600" dirty="0"/>
-                  <a:t>Output layer</a:t>
-                </a:r>
-              </a:p>
-            </p:txBody>
-          </p:sp>
-          <p:sp>
-            <p:nvSpPr>
-              <p:cNvPr id="21" name="Parentesi graffa aperta 20">
-                <a:extLst>
-                  <a:ext uri="{FF2B5EF4-FFF2-40B4-BE49-F238E27FC236}">
-                    <a16:creationId xmlns:a16="http://schemas.microsoft.com/office/drawing/2014/main" id="{CCE53FD8-F56D-7E5B-CDD4-86489E59C5E5}"/>
-                  </a:ext>
-                </a:extLst>
-              </p:cNvPr>
-              <p:cNvSpPr/>
-              <p:nvPr/>
-            </p:nvSpPr>
-            <p:spPr>
-              <a:xfrm rot="16200000">
-                <a:off x="11337009" y="3569071"/>
-                <a:ext cx="369333" cy="604745"/>
-              </a:xfrm>
-              <a:prstGeom prst="leftBrace">
-                <a:avLst/>
-              </a:prstGeom>
-              <a:ln>
-                <a:solidFill>
-                  <a:srgbClr val="FFC000"/>
-                </a:solidFill>
-              </a:ln>
-            </p:spPr>
-            <p:style>
-              <a:lnRef idx="1">
-                <a:schemeClr val="accent1"/>
-              </a:lnRef>
-              <a:fillRef idx="0">
-                <a:schemeClr val="accent1"/>
-              </a:fillRef>
-              <a:effectRef idx="0">
-                <a:schemeClr val="accent1"/>
-              </a:effectRef>
-              <a:fontRef idx="minor">
-                <a:schemeClr val="tx1"/>
-              </a:fontRef>
-            </p:style>
-            <p:txBody>
-              <a:bodyPr rtlCol="0" anchor="ctr"/>
-              <a:lstStyle/>
-              <a:p>
-                <a:pPr algn="ctr"/>
-                <a:endParaRPr lang="en-GB" dirty="0"/>
-              </a:p>
-            </p:txBody>
-          </p:sp>
-        </p:grpSp>
+            <a:prstGeom prst="rect">
+              <a:avLst/>
+            </a:prstGeom>
+          </p:spPr>
+        </p:pic>
         <p:sp>
           <p:nvSpPr>
-            <p:cNvPr id="48" name="CasellaDiTesto 47">
+            <p:cNvPr id="9" name="Parentesi graffa aperta 8">
               <a:extLst>
                 <a:ext uri="{FF2B5EF4-FFF2-40B4-BE49-F238E27FC236}">
-                  <a16:creationId xmlns:a16="http://schemas.microsoft.com/office/drawing/2014/main" id="{83161629-44F5-33DD-2A04-F8FA80307939}"/>
+                  <a16:creationId xmlns:a16="http://schemas.microsoft.com/office/drawing/2014/main" id="{89F266DD-16EF-ABBF-707D-FA85307C345B}"/>
+                </a:ext>
+              </a:extLst>
+            </p:cNvPr>
+            <p:cNvSpPr/>
+            <p:nvPr/>
+          </p:nvSpPr>
+          <p:spPr>
+            <a:xfrm>
+              <a:off x="6173056" y="2133603"/>
+              <a:ext cx="456344" cy="2044332"/>
+            </a:xfrm>
+            <a:prstGeom prst="leftBrace">
+              <a:avLst/>
+            </a:prstGeom>
+            <a:ln>
+              <a:solidFill>
+                <a:srgbClr val="FF0000"/>
+              </a:solidFill>
+            </a:ln>
+          </p:spPr>
+          <p:style>
+            <a:lnRef idx="1">
+              <a:schemeClr val="accent1"/>
+            </a:lnRef>
+            <a:fillRef idx="0">
+              <a:schemeClr val="accent1"/>
+            </a:fillRef>
+            <a:effectRef idx="0">
+              <a:schemeClr val="accent1"/>
+            </a:effectRef>
+            <a:fontRef idx="minor">
+              <a:schemeClr val="tx1"/>
+            </a:fontRef>
+          </p:style>
+          <p:txBody>
+            <a:bodyPr rtlCol="0" anchor="ctr"/>
+            <a:lstStyle/>
+            <a:p>
+              <a:pPr algn="ctr"/>
+              <a:endParaRPr lang="en-GB"/>
+            </a:p>
+          </p:txBody>
+        </p:sp>
+        <p:sp>
+          <p:nvSpPr>
+            <p:cNvPr id="10" name="CasellaDiTesto 9">
+              <a:extLst>
+                <a:ext uri="{FF2B5EF4-FFF2-40B4-BE49-F238E27FC236}">
+                  <a16:creationId xmlns:a16="http://schemas.microsoft.com/office/drawing/2014/main" id="{AC282CFD-67ED-525E-35DB-67DAEA5394FA}"/>
+                </a:ext>
+              </a:extLst>
+            </p:cNvPr>
+            <p:cNvSpPr txBox="1"/>
+            <p:nvPr/>
+          </p:nvSpPr>
+          <p:spPr>
+            <a:xfrm rot="16200000">
+              <a:off x="5354027" y="2986492"/>
+              <a:ext cx="1329836" cy="338554"/>
+            </a:xfrm>
+            <a:prstGeom prst="rect">
+              <a:avLst/>
+            </a:prstGeom>
+            <a:noFill/>
+          </p:spPr>
+          <p:txBody>
+            <a:bodyPr wrap="square" rtlCol="0">
+              <a:spAutoFit/>
+            </a:bodyPr>
+            <a:lstStyle/>
+            <a:p>
+              <a:r>
+                <a:rPr lang="en-GB" sz="1600" dirty="0"/>
+                <a:t>Input  layer</a:t>
+              </a:r>
+            </a:p>
+          </p:txBody>
+        </p:sp>
+        <p:sp>
+          <p:nvSpPr>
+            <p:cNvPr id="11" name="CasellaDiTesto 10">
+              <a:extLst>
+                <a:ext uri="{FF2B5EF4-FFF2-40B4-BE49-F238E27FC236}">
+                  <a16:creationId xmlns:a16="http://schemas.microsoft.com/office/drawing/2014/main" id="{4DC9E99E-F6E2-1567-380A-4A2DFA531764}"/>
                 </a:ext>
               </a:extLst>
             </p:cNvPr>
@@ -20812,7 +20643,148 @@
           </p:nvSpPr>
           <p:spPr>
             <a:xfrm>
-              <a:off x="3975227" y="3954956"/>
+              <a:off x="7564418" y="5240869"/>
+              <a:ext cx="1765954" cy="626572"/>
+            </a:xfrm>
+            <a:prstGeom prst="rect">
+              <a:avLst/>
+            </a:prstGeom>
+            <a:noFill/>
+          </p:spPr>
+          <p:txBody>
+            <a:bodyPr wrap="square" rtlCol="0">
+              <a:spAutoFit/>
+            </a:bodyPr>
+            <a:lstStyle/>
+            <a:p>
+              <a:pPr algn="ctr"/>
+              <a:r>
+                <a:rPr lang="en-GB" sz="1600" dirty="0"/>
+                <a:t>Hidden layer 1</a:t>
+              </a:r>
+            </a:p>
+            <a:p>
+              <a:pPr algn="ctr"/>
+              <a:r>
+                <a:rPr lang="en-GB" sz="1600" dirty="0"/>
+                <a:t>(Layer 2)</a:t>
+              </a:r>
+            </a:p>
+          </p:txBody>
+        </p:sp>
+        <p:sp>
+          <p:nvSpPr>
+            <p:cNvPr id="13" name="Parentesi graffa aperta 12">
+              <a:extLst>
+                <a:ext uri="{FF2B5EF4-FFF2-40B4-BE49-F238E27FC236}">
+                  <a16:creationId xmlns:a16="http://schemas.microsoft.com/office/drawing/2014/main" id="{B22AB3A7-03A9-F24F-B408-B6CC71A45635}"/>
+                </a:ext>
+              </a:extLst>
+            </p:cNvPr>
+            <p:cNvSpPr/>
+            <p:nvPr/>
+          </p:nvSpPr>
+          <p:spPr>
+            <a:xfrm rot="16200000">
+              <a:off x="8262730" y="4777371"/>
+              <a:ext cx="369333" cy="604745"/>
+            </a:xfrm>
+            <a:prstGeom prst="leftBrace">
+              <a:avLst/>
+            </a:prstGeom>
+            <a:ln>
+              <a:solidFill>
+                <a:srgbClr val="00B050"/>
+              </a:solidFill>
+            </a:ln>
+          </p:spPr>
+          <p:style>
+            <a:lnRef idx="1">
+              <a:schemeClr val="accent1"/>
+            </a:lnRef>
+            <a:fillRef idx="0">
+              <a:schemeClr val="accent1"/>
+            </a:fillRef>
+            <a:effectRef idx="0">
+              <a:schemeClr val="accent1"/>
+            </a:effectRef>
+            <a:fontRef idx="minor">
+              <a:schemeClr val="tx1"/>
+            </a:fontRef>
+          </p:style>
+          <p:txBody>
+            <a:bodyPr rtlCol="0" anchor="ctr"/>
+            <a:lstStyle/>
+            <a:p>
+              <a:pPr algn="ctr"/>
+              <a:endParaRPr lang="en-GB" dirty="0"/>
+            </a:p>
+          </p:txBody>
+        </p:sp>
+        <p:sp>
+          <p:nvSpPr>
+            <p:cNvPr id="18" name="Parentesi graffa aperta 17">
+              <a:extLst>
+                <a:ext uri="{FF2B5EF4-FFF2-40B4-BE49-F238E27FC236}">
+                  <a16:creationId xmlns:a16="http://schemas.microsoft.com/office/drawing/2014/main" id="{9318CFA2-7959-4CFF-CC00-DB1DE69FF68D}"/>
+                </a:ext>
+              </a:extLst>
+            </p:cNvPr>
+            <p:cNvSpPr/>
+            <p:nvPr/>
+          </p:nvSpPr>
+          <p:spPr>
+            <a:xfrm rot="16200000">
+              <a:off x="9767680" y="4071305"/>
+              <a:ext cx="369333" cy="604745"/>
+            </a:xfrm>
+            <a:prstGeom prst="leftBrace">
+              <a:avLst/>
+            </a:prstGeom>
+            <a:ln>
+              <a:solidFill>
+                <a:srgbClr val="0070C0"/>
+              </a:solidFill>
+            </a:ln>
+          </p:spPr>
+          <p:style>
+            <a:lnRef idx="1">
+              <a:schemeClr val="accent1"/>
+            </a:lnRef>
+            <a:fillRef idx="0">
+              <a:schemeClr val="accent1"/>
+            </a:fillRef>
+            <a:effectRef idx="0">
+              <a:schemeClr val="accent1"/>
+            </a:effectRef>
+            <a:fontRef idx="minor">
+              <a:schemeClr val="tx1"/>
+            </a:fontRef>
+          </p:style>
+          <p:txBody>
+            <a:bodyPr rtlCol="0" anchor="ctr"/>
+            <a:lstStyle/>
+            <a:p>
+              <a:pPr algn="ctr"/>
+              <a:endParaRPr lang="en-GB" dirty="0"/>
+            </a:p>
+          </p:txBody>
+        </p:sp>
+        <p:sp>
+          <p:nvSpPr>
+            <p:cNvPr id="20" name="CasellaDiTesto 19">
+              <a:extLst>
+                <a:ext uri="{FF2B5EF4-FFF2-40B4-BE49-F238E27FC236}">
+                  <a16:creationId xmlns:a16="http://schemas.microsoft.com/office/drawing/2014/main" id="{4EE6F2D4-C335-AED2-9CF8-CC3B156725A7}"/>
+                </a:ext>
+              </a:extLst>
+            </p:cNvPr>
+            <p:cNvSpPr txBox="1"/>
+            <p:nvPr/>
+          </p:nvSpPr>
+          <p:spPr>
+            <a:xfrm>
+              <a:off x="10856029" y="4008658"/>
               <a:ext cx="1578941" cy="338554"/>
             </a:xfrm>
             <a:prstGeom prst="rect">
@@ -20828,8 +20800,57 @@
             <a:p>
               <a:r>
                 <a:rPr lang="en-GB" sz="1600" dirty="0"/>
-                <a:t>Layer 3</a:t>
+                <a:t>Output layer</a:t>
               </a:r>
+            </a:p>
+          </p:txBody>
+        </p:sp>
+        <p:sp>
+          <p:nvSpPr>
+            <p:cNvPr id="21" name="Parentesi graffa aperta 20">
+              <a:extLst>
+                <a:ext uri="{FF2B5EF4-FFF2-40B4-BE49-F238E27FC236}">
+                  <a16:creationId xmlns:a16="http://schemas.microsoft.com/office/drawing/2014/main" id="{CCE53FD8-F56D-7E5B-CDD4-86489E59C5E5}"/>
+                </a:ext>
+              </a:extLst>
+            </p:cNvPr>
+            <p:cNvSpPr/>
+            <p:nvPr/>
+          </p:nvSpPr>
+          <p:spPr>
+            <a:xfrm rot="16200000">
+              <a:off x="11337009" y="3569071"/>
+              <a:ext cx="369333" cy="604745"/>
+            </a:xfrm>
+            <a:prstGeom prst="leftBrace">
+              <a:avLst/>
+            </a:prstGeom>
+            <a:ln>
+              <a:solidFill>
+                <a:srgbClr val="FFC000"/>
+              </a:solidFill>
+            </a:ln>
+          </p:spPr>
+          <p:style>
+            <a:lnRef idx="1">
+              <a:schemeClr val="accent1"/>
+            </a:lnRef>
+            <a:fillRef idx="0">
+              <a:schemeClr val="accent1"/>
+            </a:fillRef>
+            <a:effectRef idx="0">
+              <a:schemeClr val="accent1"/>
+            </a:effectRef>
+            <a:fontRef idx="minor">
+              <a:schemeClr val="tx1"/>
+            </a:fontRef>
+          </p:style>
+          <p:txBody>
+            <a:bodyPr rtlCol="0" anchor="ctr"/>
+            <a:lstStyle/>
+            <a:p>
+              <a:pPr algn="ctr"/>
+              <a:endParaRPr lang="en-GB" dirty="0"/>
             </a:p>
           </p:txBody>
         </p:sp>
@@ -20853,7 +20874,7 @@
           </p:nvPr>
         </p:nvPicPr>
         <p:blipFill>
-          <a:blip r:embed="rId11">
+          <a:blip r:embed="rId12">
             <a:extLst>
               <a:ext uri="{28A0092B-C50C-407E-A947-70E740481C1C}">
                 <a14:useLocalDpi xmlns:a14="http://schemas.microsoft.com/office/drawing/2010/main" val="0"/>
@@ -20917,10 +20938,10 @@
       </p:sp>
       <p:pic>
         <p:nvPicPr>
-          <p:cNvPr id="71" name="Immagine 70" descr="\documentclass{article}&#10;\usepackage{amsmath}&#10;\pagestyle{empty}&#10;\usepackage{bm}&#10;\usepackage{xcolor}&#10;\newcommand{\pmeas}{{\bf p}}&#10;\newcommand{\umeas}{{\bf u}}&#10;\newcommand{\ymeas}{{\bf y}}&#10;\newcommand{\yo}{{\bf y}^{\rm o} }&#10;&#10;\newcommand{\nin}{n_u} &#10;\newcommand{\ny}{n_y} &#10;\newcommand{\nx}{n_x} &#10;\newcommand{\np}{n_p} &#10;\definecolor{dyel}{RGB}{155,155,0}&#10;\definecolor{dgreen}{RGB}{0,100,0}&#10;\begin{document}&#10;&#10; \begin{align*}&#10;\textcolor{dyel}{y=z^4} = f(\textcolor{blue}{z^3}(\textcolor{dgreen}{z^2}(\textcolor{red}{z^1}));W,b) &#10; \end{align*}&#10;&#10;&#10;&#10;&#10;\end{document}" title="IguanaTex Bitmap Display">
-            <a:extLst>
-              <a:ext uri="{FF2B5EF4-FFF2-40B4-BE49-F238E27FC236}">
-                <a16:creationId xmlns:a16="http://schemas.microsoft.com/office/drawing/2014/main" id="{47EE6530-EE15-EF55-9668-66B79D43E348}"/>
+          <p:cNvPr id="95" name="Immagine 94" descr="\documentclass{article}&#10;\usepackage{amsmath}&#10;\pagestyle{empty}&#10;\usepackage{bm}&#10;\usepackage{color}&#10;\newcommand{\pmeas}{{\bf p}}&#10;\newcommand{\umeas}{{\bf u}}&#10;\newcommand{\ymeas}{{\bf y}}&#10;\newcommand{\yo}{{\bf y}^{\rm o} }&#10;&#10;\newcommand{\nin}{n_u} &#10;\newcommand{\ny}{n_y} &#10;\newcommand{\nx}{n_x} &#10;\newcommand{\np}{n_p} &#10;\newcommand{\red}[1]{{\color{red}#1}}&#10;\usepackage{xcolor}&#10;\definecolor{dyel}{RGB}{155,155,0}&#10;\begin{document}&#10;&#10; \begin{align*}&#10; \textcolor{dyel}{\hat{y}(k)}   = &amp;  f\big(\underset{\textcolor{red}{z^1(k)}}{\underbrace{y(k-1),  \ldots, y(k-na), u(k),  u(k-1), \ldots,  u(k-nb)}}; W,b \big) &#10; \end{align*}&#10;&#10;&#10;&#10;&#10;\end{document}" title="IguanaTex Bitmap Display">
+            <a:extLst>
+              <a:ext uri="{FF2B5EF4-FFF2-40B4-BE49-F238E27FC236}">
+                <a16:creationId xmlns:a16="http://schemas.microsoft.com/office/drawing/2014/main" id="{4BD288B0-5FA5-B7AF-C809-C3E0733BB905}"/>
               </a:ext>
             </a:extLst>
           </p:cNvPr>
@@ -20934,7 +20955,7 @@
           </p:nvPr>
         </p:nvPicPr>
         <p:blipFill>
-          <a:blip r:embed="rId12">
+          <a:blip r:embed="rId13">
             <a:extLst>
               <a:ext uri="{28A0092B-C50C-407E-A947-70E740481C1C}">
                 <a14:useLocalDpi xmlns:a14="http://schemas.microsoft.com/office/drawing/2010/main" val="0"/>
@@ -20947,8 +20968,8 @@
         </p:blipFill>
         <p:spPr>
           <a:xfrm>
-            <a:off x="8246211" y="3991001"/>
-            <a:ext cx="2561344" cy="240175"/>
+            <a:off x="920231" y="5660246"/>
+            <a:ext cx="7081325" cy="650111"/>
           </a:xfrm>
           <a:prstGeom prst="rect">
             <a:avLst/>
@@ -20957,10 +20978,10 @@
       </p:pic>
       <p:pic>
         <p:nvPicPr>
-          <p:cNvPr id="95" name="Immagine 94" descr="\documentclass{article}&#10;\usepackage{amsmath}&#10;\pagestyle{empty}&#10;\usepackage{bm}&#10;\usepackage{color}&#10;\newcommand{\pmeas}{{\bf p}}&#10;\newcommand{\umeas}{{\bf u}}&#10;\newcommand{\ymeas}{{\bf y}}&#10;\newcommand{\yo}{{\bf y}^{\rm o} }&#10;&#10;\newcommand{\nin}{n_u} &#10;\newcommand{\ny}{n_y} &#10;\newcommand{\nx}{n_x} &#10;\newcommand{\np}{n_p} &#10;\newcommand{\red}[1]{{\color{red}#1}}&#10;\usepackage{xcolor}&#10;\definecolor{dyel}{RGB}{155,155,0}&#10;\begin{document}&#10;&#10; \begin{align*}&#10; \textcolor{dyel}{\hat{y}(k)}   = &amp;  f\big(\underset{\textcolor{red}{z^1(k)}}{\underbrace{y(k-1),  \ldots, y(k-na), u(k),  u(k-1), \ldots,  u(k-nb)}}; W,b \big) &#10; \end{align*}&#10;&#10;&#10;&#10;&#10;\end{document}" title="IguanaTex Bitmap Display">
-            <a:extLst>
-              <a:ext uri="{FF2B5EF4-FFF2-40B4-BE49-F238E27FC236}">
-                <a16:creationId xmlns:a16="http://schemas.microsoft.com/office/drawing/2014/main" id="{4BD288B0-5FA5-B7AF-C809-C3E0733BB905}"/>
+          <p:cNvPr id="6" name="Picture 5" descr="\documentclass{article}&#10;\usepackage{amsmath}&#10;\usepackage{amsfonts}&#10;\usepackage{color}&#10;\newcommand{\red}[1]{{\color{red}#1}}&#10;&#10;\pagestyle{empty}&#10;&#10;\begin{document}&#10;&#10;Overall: $y = W_3\sigma\big(W_2\sigma(W_1 x + b_1)+b_2\big) + b_3$&#10;&#10;\end{document}" title="IguanaTex Bitmap Display">
+            <a:extLst>
+              <a:ext uri="{FF2B5EF4-FFF2-40B4-BE49-F238E27FC236}">
+                <a16:creationId xmlns:a16="http://schemas.microsoft.com/office/drawing/2014/main" id="{AD1A16A6-2BE7-D4FB-65D1-3E2BE01DE9A6}"/>
               </a:ext>
             </a:extLst>
           </p:cNvPr>
@@ -20974,27 +20995,98 @@
           </p:nvPr>
         </p:nvPicPr>
         <p:blipFill>
-          <a:blip r:embed="rId13">
-            <a:extLst>
-              <a:ext uri="{28A0092B-C50C-407E-A947-70E740481C1C}">
-                <a14:useLocalDpi xmlns:a14="http://schemas.microsoft.com/office/drawing/2010/main" val="0"/>
-              </a:ext>
-            </a:extLst>
-          </a:blip>
+          <a:blip r:embed="rId14"/>
           <a:stretch>
             <a:fillRect/>
           </a:stretch>
         </p:blipFill>
         <p:spPr>
           <a:xfrm>
-            <a:off x="920231" y="5660246"/>
-            <a:ext cx="7081325" cy="650111"/>
+            <a:off x="6748808" y="4309331"/>
+            <a:ext cx="4683132" cy="288193"/>
           </a:xfrm>
           <a:prstGeom prst="rect">
             <a:avLst/>
           </a:prstGeom>
         </p:spPr>
       </p:pic>
+      <p:pic>
+        <p:nvPicPr>
+          <p:cNvPr id="26" name="Picture 25" descr="\documentclass{article}&#10;\usepackage{amsmath}&#10;\usepackage{amsfonts}&#10;\usepackage{color}&#10;\newcommand{\red}[1]{{\color{red}#1}}&#10;&#10;\pagestyle{empty}&#10;&#10;\begin{document}&#10;&#10;$$&#10;x = z^1&#10;$$&#10;&#10;\end{document}" title="IguanaTex Bitmap Display">
+            <a:extLst>
+              <a:ext uri="{FF2B5EF4-FFF2-40B4-BE49-F238E27FC236}">
+                <a16:creationId xmlns:a16="http://schemas.microsoft.com/office/drawing/2014/main" id="{79F470BE-6D2A-1CD3-DD6C-4FDDD2237358}"/>
+              </a:ext>
+            </a:extLst>
+          </p:cNvPr>
+          <p:cNvPicPr>
+            <a:picLocks noChangeAspect="1"/>
+          </p:cNvPicPr>
+          <p:nvPr>
+            <p:custDataLst>
+              <p:tags r:id="rId6"/>
+            </p:custDataLst>
+          </p:nvPr>
+        </p:nvPicPr>
+        <p:blipFill>
+          <a:blip r:embed="rId15"/>
+          <a:stretch>
+            <a:fillRect/>
+          </a:stretch>
+        </p:blipFill>
+        <p:spPr>
+          <a:xfrm>
+            <a:off x="1028568" y="1181759"/>
+            <a:ext cx="617220" cy="205740"/>
+          </a:xfrm>
+          <a:prstGeom prst="rect">
+            <a:avLst/>
+          </a:prstGeom>
+        </p:spPr>
+      </p:pic>
+      <p:sp>
+        <p:nvSpPr>
+          <p:cNvPr id="4" name="TextBox 3">
+            <a:extLst>
+              <a:ext uri="{FF2B5EF4-FFF2-40B4-BE49-F238E27FC236}">
+                <a16:creationId xmlns:a16="http://schemas.microsoft.com/office/drawing/2014/main" id="{D843F3B5-A53E-5BDA-6E13-4AE92715358C}"/>
+              </a:ext>
+            </a:extLst>
+          </p:cNvPr>
+          <p:cNvSpPr txBox="1"/>
+          <p:nvPr/>
+        </p:nvSpPr>
+        <p:spPr>
+          <a:xfrm>
+            <a:off x="3090809" y="3699149"/>
+            <a:ext cx="2098275" cy="584775"/>
+          </a:xfrm>
+          <a:prstGeom prst="rect">
+            <a:avLst/>
+          </a:prstGeom>
+          <a:noFill/>
+        </p:spPr>
+        <p:txBody>
+          <a:bodyPr wrap="square">
+            <a:spAutoFit/>
+          </a:bodyPr>
+          <a:lstStyle/>
+          <a:p>
+            <a:pPr algn="ctr"/>
+            <a:r>
+              <a:rPr lang="en-GB" sz="1600" dirty="0"/>
+              <a:t>Hidden layer 2</a:t>
+            </a:r>
+          </a:p>
+          <a:p>
+            <a:pPr algn="ctr"/>
+            <a:r>
+              <a:rPr lang="en-GB" sz="1600" dirty="0"/>
+              <a:t>(Layer 3)</a:t>
+            </a:r>
+          </a:p>
+        </p:txBody>
+      </p:sp>
     </p:spTree>
     <p:extLst>
       <p:ext uri="{BB962C8B-B14F-4D97-AF65-F5344CB8AC3E}">
@@ -21039,7 +21131,7 @@
                                           </p:stCondLst>
                                         </p:cTn>
                                         <p:tgtEl>
-                                          <p:spTgt spid="71"/>
+                                          <p:spTgt spid="6"/>
                                         </p:tgtEl>
                                         <p:attrNameLst>
                                           <p:attrName>style.visibility</p:attrName>
@@ -21442,7 +21534,7 @@
                   <a:srgbClr val="FF0000"/>
                 </a:solidFill>
               </a:rPr>
-              <a:t>Instantiate the model class, run and print the model</a:t>
+              <a:t>Instantiate the model class, run and show model</a:t>
             </a:r>
           </a:p>
         </p:txBody>
@@ -22407,7 +22499,7 @@
         </p:nvSpPr>
         <p:spPr>
           <a:xfrm>
-            <a:off x="1174289" y="3364972"/>
+            <a:off x="946159" y="3254193"/>
             <a:ext cx="971334" cy="369332"/>
           </a:xfrm>
           <a:prstGeom prst="rect">
@@ -22644,10 +22736,10 @@
       </p:sp>
       <p:pic>
         <p:nvPicPr>
-          <p:cNvPr id="8" name="Picture 7" descr="\documentclass{article}&#10;\usepackage{amsmath}&#10;\pagestyle{empty}&#10;\usepackage{bm}&#10;\usepackage{color}&#10;\newcommand{\pmeas}{{\bf p}}&#10;\newcommand{\umeas}{{\bf u}}&#10;\newcommand{\ymeas}{{\bf y}}&#10;\newcommand{\yo}{{\bf y}^{\rm o} }&#10;&#10;\newcommand{\nin}{n_u} &#10;\newcommand{\ny}{n_y} &#10;\newcommand{\nx}{n_x} &#10;\newcommand{\np}{n_p} &#10;\newcommand{\red}[1]{{\color{red}#1}}&#10;\usepackage{xcolor}&#10;\definecolor{dyel}{RGB}{155,155,0}&#10;\begin{document}&#10;&#10; \begin{align*}&#10; \hat{y}(t) = \red{W_{ho}} h(t)  + \red{b_{hy}}&#10; \end{align*}&#10;&#10;&#10;&#10;&#10;\end{document}" title="IguanaTex Bitmap Display">
-            <a:extLst>
-              <a:ext uri="{FF2B5EF4-FFF2-40B4-BE49-F238E27FC236}">
-                <a16:creationId xmlns:a16="http://schemas.microsoft.com/office/drawing/2014/main" id="{90FFDEE7-093C-13AF-CDF3-07A4D2407158}"/>
+          <p:cNvPr id="31" name="Picture 30" descr="\documentclass{article}&#10;\usepackage{amsmath}&#10;\pagestyle{empty}&#10;\usepackage{bm}&#10;\usepackage{color}&#10;\newcommand{\pmeas}{{\bf p}}&#10;\newcommand{\umeas}{{\bf u}}&#10;\newcommand{\ymeas}{{\bf y}}&#10;\newcommand{\yo}{{\bf y}^{\rm o} }&#10;&#10;\newcommand{\nin}{n_u} &#10;\newcommand{\ny}{n_y} &#10;\newcommand{\nx}{n_x} &#10;\newcommand{\np}{n_p} &#10;\newcommand{\red}[1]{{\color{red}#1}}&#10;\usepackage{xcolor}&#10;\definecolor{dyel}{RGB}{155,155,0}&#10;\begin{document}&#10;&#10; \begin{align*}&#10; \hat{y}(t) = g(h(t); \red{W_g})&#10; \end{align*}&#10;&#10;&#10;&#10;&#10;\end{document}" title="IguanaTex Bitmap Display">
+            <a:extLst>
+              <a:ext uri="{FF2B5EF4-FFF2-40B4-BE49-F238E27FC236}">
+                <a16:creationId xmlns:a16="http://schemas.microsoft.com/office/drawing/2014/main" id="{3BC8E85A-472C-F90E-BED2-C6737D34A3DB}"/>
               </a:ext>
             </a:extLst>
           </p:cNvPr>
@@ -22669,7 +22761,7 @@
         <p:spPr>
           <a:xfrm>
             <a:off x="548631" y="6224505"/>
-            <a:ext cx="2184788" cy="267029"/>
+            <a:ext cx="1869207" cy="267029"/>
           </a:xfrm>
           <a:prstGeom prst="rect">
             <a:avLst/>
@@ -28799,6 +28891,24 @@
 <file path=ppt/tags/tag10.xml><?xml version="1.0" encoding="utf-8"?>
 <p:tagLst xmlns:a="http://schemas.openxmlformats.org/drawingml/2006/main" xmlns:r="http://schemas.openxmlformats.org/officeDocument/2006/relationships" xmlns:p="http://schemas.openxmlformats.org/presentationml/2006/main">
   <p:tag name="OUTPUTDPI" val="2000"/>
+  <p:tag name="ORIGINALHEIGHT" val="602.9246"/>
+  <p:tag name="ORIGINALWIDTH" val="2208.474"/>
+  <p:tag name="LATEXADDIN" val="\documentclass{article}&#10;\usepackage{amsmath}&#10;\pagestyle{empty}&#10;\usepackage{bm}&#10;\usepackage{color}&#10;\newcommand{\pmeas}{{\bf p}}&#10;\newcommand{\umeas}{{\bf u}}&#10;\newcommand{\ymeas}{{\bf y}}&#10;\newcommand{\yo}{{\bf y}^{\rm o} }&#10;&#10;\newcommand{\nin}{n_u} &#10;\newcommand{\ny}{n_y} &#10;\newcommand{\nx}{n_x} &#10;\newcommand{\np}{n_p} &#10;\newcommand{\red}[1]{{\color{red}#1}}&#10;\usepackage{xcolor}&#10;\definecolor{dyel}{RGB}{155,155,0}&#10;\begin{document}&#10;&#10; \begin{align*}&#10; \mathcal{L} = \frac{1}{T} \sum_{t=0}^{T} \left\|\hat{y}(t) - y(t)\right\|^2&#10; \end{align*}&#10;&#10;&#10;&#10;&#10;\end{document}"/>
+  <p:tag name="IGUANATEXSIZE" val="24"/>
+  <p:tag name="IGUANATEXCURSOR" val="477"/>
+  <p:tag name="TRANSPARENCY" val="Vero"/>
+  <p:tag name="LATEXENGINEID" val="0"/>
+  <p:tag name="TEMPFOLDER" val="\\supsi.ch\DTI\HOME\dario.piga\Desktop\Testppt\temp\"/>
+  <p:tag name="LATEXFORMHEIGHT" val="312"/>
+  <p:tag name="LATEXFORMWIDTH" val="384"/>
+  <p:tag name="LATEXFORMWRAP" val="Vero"/>
+  <p:tag name="BITMAPVECTOR" val="0"/>
+</p:tagLst>
+</file>
+
+<file path=ppt/tags/tag11.xml><?xml version="1.0" encoding="utf-8"?>
+<p:tagLst xmlns:a="http://schemas.openxmlformats.org/drawingml/2006/main" xmlns:r="http://schemas.openxmlformats.org/officeDocument/2006/relationships" xmlns:p="http://schemas.openxmlformats.org/presentationml/2006/main">
+  <p:tag name="OUTPUTDPI" val="2000"/>
   <p:tag name="ORIGINALHEIGHT" val="606.6742"/>
   <p:tag name="ORIGINALWIDTH" val="3254.593"/>
   <p:tag name="LATEXADDIN" val="\documentclass{article}&#10;\usepackage{amsmath}&#10;\pagestyle{empty}&#10;\usepackage{bm}&#10;\usepackage{color}&#10;\newcommand{\pmeas}{{\bf p}}&#10;\newcommand{\umeas}{{\bf u}}&#10;\newcommand{\ymeas}{{\bf y}}&#10;\newcommand{\yo}{{\bf y}^{\rm o} }&#10;&#10;\newcommand{\nin}{n_u} &#10;\newcommand{\ny}{n_y} &#10;\newcommand{\nx}{n_x} &#10;\newcommand{\np}{n_p} &#10;\newcommand{\red}[1]{{\color{red}#1}}&#10;\usepackage{xcolor}&#10;\definecolor{dyel}{RGB}{155,155,0}&#10;\begin{document}&#10;&#10; \begin{align*}&#10; \mathcal{L}^{(q)} = \frac{1}{L} \sum_{i=0}^{L} \left\|\hat{y}(t_q+i) - y(t_q+i)\right\|^2&#10; \end{align*}&#10;&#10;&#10;&#10;&#10;\end{document}"/>
@@ -28814,7 +28924,7 @@
 </p:tagLst>
 </file>
 
-<file path=ppt/tags/tag11.xml><?xml version="1.0" encoding="utf-8"?>
+<file path=ppt/tags/tag12.xml><?xml version="1.0" encoding="utf-8"?>
 <p:tagLst xmlns:a="http://schemas.openxmlformats.org/drawingml/2006/main" xmlns:r="http://schemas.openxmlformats.org/officeDocument/2006/relationships" xmlns:p="http://schemas.openxmlformats.org/presentationml/2006/main">
   <p:tag name="OUTPUTDPI" val="2000"/>
   <p:tag name="ORIGINALHEIGHT" val="641.9197"/>
@@ -28832,7 +28942,7 @@
 </p:tagLst>
 </file>
 
-<file path=ppt/tags/tag12.xml><?xml version="1.0" encoding="utf-8"?>
+<file path=ppt/tags/tag13.xml><?xml version="1.0" encoding="utf-8"?>
 <p:tagLst xmlns:a="http://schemas.openxmlformats.org/drawingml/2006/main" xmlns:r="http://schemas.openxmlformats.org/officeDocument/2006/relationships" xmlns:p="http://schemas.openxmlformats.org/presentationml/2006/main">
   <p:tag name="OUTPUTDPI" val="2000"/>
   <p:tag name="ORIGINALHEIGHT" val="216.7229"/>
@@ -28850,7 +28960,7 @@
 </p:tagLst>
 </file>
 
-<file path=ppt/tags/tag13.xml><?xml version="1.0" encoding="utf-8"?>
+<file path=ppt/tags/tag14.xml><?xml version="1.0" encoding="utf-8"?>
 <p:tagLst xmlns:a="http://schemas.openxmlformats.org/drawingml/2006/main" xmlns:r="http://schemas.openxmlformats.org/officeDocument/2006/relationships" xmlns:p="http://schemas.openxmlformats.org/presentationml/2006/main">
   <p:tag name="OUTPUTDPI" val="2000"/>
   <p:tag name="ORIGINALHEIGHT" val="10"/>
@@ -28870,7 +28980,7 @@
 </p:tagLst>
 </file>
 
-<file path=ppt/tags/tag14.xml><?xml version="1.0" encoding="utf-8"?>
+<file path=ppt/tags/tag15.xml><?xml version="1.0" encoding="utf-8"?>
 <p:tagLst xmlns:a="http://schemas.openxmlformats.org/drawingml/2006/main" xmlns:r="http://schemas.openxmlformats.org/officeDocument/2006/relationships" xmlns:p="http://schemas.openxmlformats.org/presentationml/2006/main">
   <p:tag name="OUTPUTDPI" val="2000"/>
   <p:tag name="ORIGINALHEIGHT" val="207.724"/>
@@ -28888,7 +28998,7 @@
 </p:tagLst>
 </file>
 
-<file path=ppt/tags/tag15.xml><?xml version="1.0" encoding="utf-8"?>
+<file path=ppt/tags/tag16.xml><?xml version="1.0" encoding="utf-8"?>
 <p:tagLst xmlns:a="http://schemas.openxmlformats.org/drawingml/2006/main" xmlns:r="http://schemas.openxmlformats.org/officeDocument/2006/relationships" xmlns:p="http://schemas.openxmlformats.org/presentationml/2006/main">
   <p:tag name="OUTPUTDPI" val="2000"/>
   <p:tag name="ORIGINALHEIGHT" val="207.724"/>
@@ -28906,7 +29016,7 @@
 </p:tagLst>
 </file>
 
-<file path=ppt/tags/tag16.xml><?xml version="1.0" encoding="utf-8"?>
+<file path=ppt/tags/tag17.xml><?xml version="1.0" encoding="utf-8"?>
 <p:tagLst xmlns:a="http://schemas.openxmlformats.org/drawingml/2006/main" xmlns:r="http://schemas.openxmlformats.org/officeDocument/2006/relationships" xmlns:p="http://schemas.openxmlformats.org/presentationml/2006/main">
   <p:tag name="OUTPUTDPI" val="2000"/>
   <p:tag name="ORIGINALHEIGHT" val="184.4769"/>
@@ -28924,7 +29034,7 @@
 </p:tagLst>
 </file>
 
-<file path=ppt/tags/tag17.xml><?xml version="1.0" encoding="utf-8"?>
+<file path=ppt/tags/tag18.xml><?xml version="1.0" encoding="utf-8"?>
 <p:tagLst xmlns:a="http://schemas.openxmlformats.org/drawingml/2006/main" xmlns:r="http://schemas.openxmlformats.org/officeDocument/2006/relationships" xmlns:p="http://schemas.openxmlformats.org/presentationml/2006/main">
   <p:tag name="OUTPUTDPI" val="2000"/>
   <p:tag name="ORIGINALHEIGHT" val="233.9708"/>
@@ -28942,7 +29052,7 @@
 </p:tagLst>
 </file>
 
-<file path=ppt/tags/tag18.xml><?xml version="1.0" encoding="utf-8"?>
+<file path=ppt/tags/tag19.xml><?xml version="1.0" encoding="utf-8"?>
 <p:tagLst xmlns:a="http://schemas.openxmlformats.org/drawingml/2006/main" xmlns:r="http://schemas.openxmlformats.org/officeDocument/2006/relationships" xmlns:p="http://schemas.openxmlformats.org/presentationml/2006/main">
   <p:tag name="OUTPUTDPI" val="2000"/>
   <p:tag name="ORIGINALHEIGHT" val="234.7206"/>
@@ -28950,24 +29060,6 @@
   <p:tag name="LATEXADDIN" val="\documentclass{article}&#10;\usepackage{amsmath}&#10;\pagestyle{empty}&#10;\usepackage{bm}&#10;\newcommand{\pmeas}{{\bf p}}&#10;\newcommand{\umeas}{{\bf u}}&#10;\newcommand{\ymeas}{{\bf y}}&#10;\newcommand{\yo}{{\bf y}^{\rm o} }&#10;&#10;\newcommand{\nin}{n_u} &#10;\newcommand{\ny}{n_y} &#10;\newcommand{\nx}{n_x} &#10;\newcommand{\np}{n_p} &#10;\begin{document}&#10;&#10; \begin{align*}&#10; z^4 = f_3(z^3,\theta_3) = \ell(x; \theta) &#10; \end{align*}&#10;&#10;&#10;&#10;&#10;\end{document}"/>
   <p:tag name="IGUANATEXSIZE" val="16"/>
   <p:tag name="IGUANATEXCURSOR" val="339"/>
-  <p:tag name="TRANSPARENCY" val="Vero"/>
-  <p:tag name="LATEXENGINEID" val="0"/>
-  <p:tag name="TEMPFOLDER" val="\\supsi.ch\DTI\HOME\dario.piga\Desktop\Testppt\temp\"/>
-  <p:tag name="LATEXFORMHEIGHT" val="312"/>
-  <p:tag name="LATEXFORMWIDTH" val="384"/>
-  <p:tag name="LATEXFORMWRAP" val="Vero"/>
-  <p:tag name="BITMAPVECTOR" val="0"/>
-</p:tagLst>
-</file>
-
-<file path=ppt/tags/tag19.xml><?xml version="1.0" encoding="utf-8"?>
-<p:tagLst xmlns:a="http://schemas.openxmlformats.org/drawingml/2006/main" xmlns:r="http://schemas.openxmlformats.org/officeDocument/2006/relationships" xmlns:p="http://schemas.openxmlformats.org/presentationml/2006/main">
-  <p:tag name="OUTPUTDPI" val="2000"/>
-  <p:tag name="ORIGINALHEIGHT" val="177.7278"/>
-  <p:tag name="ORIGINALWIDTH" val="158.2302"/>
-  <p:tag name="LATEXADDIN" val="\documentclass{article}&#10;\usepackage{amsmath}&#10;\pagestyle{empty}&#10;\usepackage{bm}&#10;\usepackage{xcolor}&#10;\newcommand{\pmeas}{{\bf p}}&#10;\newcommand{\umeas}{{\bf u}}&#10;\newcommand{\ymeas}{{\bf y}}&#10;\newcommand{\yo}{{\bf y}^{\rm o} }&#10;&#10;\newcommand{\nin}{n_u} &#10;\newcommand{\ny}{n_y} &#10;\newcommand{\nx}{n_x} &#10;\newcommand{\np}{n_p} &#10;\begin{document}&#10;&#10; \begin{align*}&#10; {\color{white}{\theta_1}}&#10; \end{align*}&#10;&#10;&#10;&#10;&#10;\end{document}"/>
-  <p:tag name="IGUANATEXSIZE" val="24"/>
-  <p:tag name="IGUANATEXCURSOR" val="375"/>
   <p:tag name="TRANSPARENCY" val="Vero"/>
   <p:tag name="LATEXENGINEID" val="0"/>
   <p:tag name="TEMPFOLDER" val="\\supsi.ch\DTI\HOME\dario.piga\Desktop\Testppt\temp\"/>
@@ -29000,6 +29092,24 @@
 <p:tagLst xmlns:a="http://schemas.openxmlformats.org/drawingml/2006/main" xmlns:r="http://schemas.openxmlformats.org/officeDocument/2006/relationships" xmlns:p="http://schemas.openxmlformats.org/presentationml/2006/main">
   <p:tag name="OUTPUTDPI" val="2000"/>
   <p:tag name="ORIGINALHEIGHT" val="177.7278"/>
+  <p:tag name="ORIGINALWIDTH" val="158.2302"/>
+  <p:tag name="LATEXADDIN" val="\documentclass{article}&#10;\usepackage{amsmath}&#10;\pagestyle{empty}&#10;\usepackage{bm}&#10;\usepackage{xcolor}&#10;\newcommand{\pmeas}{{\bf p}}&#10;\newcommand{\umeas}{{\bf u}}&#10;\newcommand{\ymeas}{{\bf y}}&#10;\newcommand{\yo}{{\bf y}^{\rm o} }&#10;&#10;\newcommand{\nin}{n_u} &#10;\newcommand{\ny}{n_y} &#10;\newcommand{\nx}{n_x} &#10;\newcommand{\np}{n_p} &#10;\begin{document}&#10;&#10; \begin{align*}&#10; {\color{white}{\theta_1}}&#10; \end{align*}&#10;&#10;&#10;&#10;&#10;\end{document}"/>
+  <p:tag name="IGUANATEXSIZE" val="24"/>
+  <p:tag name="IGUANATEXCURSOR" val="375"/>
+  <p:tag name="TRANSPARENCY" val="Vero"/>
+  <p:tag name="LATEXENGINEID" val="0"/>
+  <p:tag name="TEMPFOLDER" val="\\supsi.ch\DTI\HOME\dario.piga\Desktop\Testppt\temp\"/>
+  <p:tag name="LATEXFORMHEIGHT" val="312"/>
+  <p:tag name="LATEXFORMWIDTH" val="384"/>
+  <p:tag name="LATEXFORMWRAP" val="Vero"/>
+  <p:tag name="BITMAPVECTOR" val="0"/>
+</p:tagLst>
+</file>
+
+<file path=ppt/tags/tag21.xml><?xml version="1.0" encoding="utf-8"?>
+<p:tagLst xmlns:a="http://schemas.openxmlformats.org/drawingml/2006/main" xmlns:r="http://schemas.openxmlformats.org/officeDocument/2006/relationships" xmlns:p="http://schemas.openxmlformats.org/presentationml/2006/main">
+  <p:tag name="OUTPUTDPI" val="2000"/>
+  <p:tag name="ORIGINALHEIGHT" val="177.7278"/>
   <p:tag name="ORIGINALWIDTH" val="162.7297"/>
   <p:tag name="LATEXADDIN" val="\documentclass{article}&#10;\usepackage{amsmath}&#10;\pagestyle{empty}&#10;\usepackage{bm}&#10;\usepackage{xcolor}&#10;\newcommand{\pmeas}{{\bf p}}&#10;\newcommand{\umeas}{{\bf u}}&#10;\newcommand{\ymeas}{{\bf y}}&#10;\newcommand{\yo}{{\bf y}^{\rm o} }&#10;&#10;\newcommand{\nin}{n_u} &#10;\newcommand{\ny}{n_y} &#10;\newcommand{\nx}{n_x} &#10;\newcommand{\np}{n_p} &#10;\begin{document}&#10;&#10; \begin{align*}&#10; {\color{white}{\theta_2}}&#10; \end{align*}&#10;&#10;&#10;&#10;&#10;\end{document}"/>
   <p:tag name="IGUANATEXSIZE" val="24"/>
@@ -29014,7 +29124,7 @@
 </p:tagLst>
 </file>
 
-<file path=ppt/tags/tag21.xml><?xml version="1.0" encoding="utf-8"?>
+<file path=ppt/tags/tag22.xml><?xml version="1.0" encoding="utf-8"?>
 <p:tagLst xmlns:a="http://schemas.openxmlformats.org/drawingml/2006/main" xmlns:r="http://schemas.openxmlformats.org/officeDocument/2006/relationships" xmlns:p="http://schemas.openxmlformats.org/presentationml/2006/main">
   <p:tag name="OUTPUTDPI" val="2000"/>
   <p:tag name="ORIGINALHEIGHT" val="180.7274"/>
@@ -29032,7 +29142,7 @@
 </p:tagLst>
 </file>
 
-<file path=ppt/tags/tag22.xml><?xml version="1.0" encoding="utf-8"?>
+<file path=ppt/tags/tag23.xml><?xml version="1.0" encoding="utf-8"?>
 <p:tagLst xmlns:a="http://schemas.openxmlformats.org/drawingml/2006/main" xmlns:r="http://schemas.openxmlformats.org/officeDocument/2006/relationships" xmlns:p="http://schemas.openxmlformats.org/presentationml/2006/main">
   <p:tag name="OUTPUTDPI" val="2000"/>
   <p:tag name="ORIGINALHEIGHT" val="252.7184"/>
@@ -29050,7 +29160,7 @@
 </p:tagLst>
 </file>
 
-<file path=ppt/tags/tag23.xml><?xml version="1.0" encoding="utf-8"?>
+<file path=ppt/tags/tag24.xml><?xml version="1.0" encoding="utf-8"?>
 <p:tagLst xmlns:a="http://schemas.openxmlformats.org/drawingml/2006/main" xmlns:r="http://schemas.openxmlformats.org/officeDocument/2006/relationships" xmlns:p="http://schemas.openxmlformats.org/presentationml/2006/main">
   <p:tag name="OUTPUTDPI" val="2000"/>
   <p:tag name="ORIGINALHEIGHT" val="233.9708"/>
@@ -29068,7 +29178,7 @@
 </p:tagLst>
 </file>
 
-<file path=ppt/tags/tag24.xml><?xml version="1.0" encoding="utf-8"?>
+<file path=ppt/tags/tag25.xml><?xml version="1.0" encoding="utf-8"?>
 <p:tagLst xmlns:a="http://schemas.openxmlformats.org/drawingml/2006/main" xmlns:r="http://schemas.openxmlformats.org/officeDocument/2006/relationships" xmlns:p="http://schemas.openxmlformats.org/presentationml/2006/main">
   <p:tag name="OUTPUTDPI" val="2000"/>
   <p:tag name="ORIGINALHEIGHT" val="465.6918"/>
@@ -29086,7 +29196,7 @@
 </p:tagLst>
 </file>
 
-<file path=ppt/tags/tag25.xml><?xml version="1.0" encoding="utf-8"?>
+<file path=ppt/tags/tag26.xml><?xml version="1.0" encoding="utf-8"?>
 <p:tagLst xmlns:a="http://schemas.openxmlformats.org/drawingml/2006/main" xmlns:r="http://schemas.openxmlformats.org/officeDocument/2006/relationships" xmlns:p="http://schemas.openxmlformats.org/presentationml/2006/main">
   <p:tag name="OUTPUTDPI" val="2000"/>
   <p:tag name="ORIGINALHEIGHT" val="435.6955"/>
@@ -29104,7 +29214,7 @@
 </p:tagLst>
 </file>
 
-<file path=ppt/tags/tag26.xml><?xml version="1.0" encoding="utf-8"?>
+<file path=ppt/tags/tag27.xml><?xml version="1.0" encoding="utf-8"?>
 <p:tagLst xmlns:a="http://schemas.openxmlformats.org/drawingml/2006/main" xmlns:r="http://schemas.openxmlformats.org/officeDocument/2006/relationships" xmlns:p="http://schemas.openxmlformats.org/presentationml/2006/main">
   <p:tag name="OUTPUTDPI" val="2000"/>
   <p:tag name="ORIGINALHEIGHT" val="435.6955"/>
@@ -29122,7 +29232,7 @@
 </p:tagLst>
 </file>
 
-<file path=ppt/tags/tag27.xml><?xml version="1.0" encoding="utf-8"?>
+<file path=ppt/tags/tag28.xml><?xml version="1.0" encoding="utf-8"?>
 <p:tagLst xmlns:a="http://schemas.openxmlformats.org/drawingml/2006/main" xmlns:r="http://schemas.openxmlformats.org/officeDocument/2006/relationships" xmlns:p="http://schemas.openxmlformats.org/presentationml/2006/main">
   <p:tag name="OUTPUTDPI" val="2000"/>
   <p:tag name="ORIGINALHEIGHT" val="177.7278"/>
@@ -29140,30 +29250,12 @@
 </p:tagLst>
 </file>
 
-<file path=ppt/tags/tag28.xml><?xml version="1.0" encoding="utf-8"?>
+<file path=ppt/tags/tag29.xml><?xml version="1.0" encoding="utf-8"?>
 <p:tagLst xmlns:a="http://schemas.openxmlformats.org/drawingml/2006/main" xmlns:r="http://schemas.openxmlformats.org/officeDocument/2006/relationships" xmlns:p="http://schemas.openxmlformats.org/presentationml/2006/main">
   <p:tag name="OUTPUTDPI" val="2000"/>
   <p:tag name="ORIGINALHEIGHT" val="177.7278"/>
   <p:tag name="ORIGINALWIDTH" val="162.7297"/>
   <p:tag name="LATEXADDIN" val="\documentclass{article}&#10;\usepackage{amsmath}&#10;\pagestyle{empty}&#10;\usepackage{bm}&#10;\usepackage{xcolor}&#10;\newcommand{\pmeas}{{\bf p}}&#10;\newcommand{\umeas}{{\bf u}}&#10;\newcommand{\ymeas}{{\bf y}}&#10;\newcommand{\yo}{{\bf y}^{\rm o} }&#10;&#10;\newcommand{\nin}{n_u} &#10;\newcommand{\ny}{n_y} &#10;\newcommand{\nx}{n_x} &#10;\newcommand{\np}{n_p} &#10;\begin{document}&#10;&#10; \begin{align*}&#10; {\color{white}{\theta_2}}&#10; \end{align*}&#10;&#10;&#10;&#10;&#10;\end{document}"/>
-  <p:tag name="IGUANATEXSIZE" val="24"/>
-  <p:tag name="IGUANATEXCURSOR" val="373"/>
-  <p:tag name="TRANSPARENCY" val="Vero"/>
-  <p:tag name="LATEXENGINEID" val="0"/>
-  <p:tag name="TEMPFOLDER" val="\\supsi.ch\DTI\HOME\dario.piga\Desktop\Testppt\temp\"/>
-  <p:tag name="LATEXFORMHEIGHT" val="312"/>
-  <p:tag name="LATEXFORMWIDTH" val="384"/>
-  <p:tag name="LATEXFORMWRAP" val="Vero"/>
-  <p:tag name="BITMAPVECTOR" val="0"/>
-</p:tagLst>
-</file>
-
-<file path=ppt/tags/tag29.xml><?xml version="1.0" encoding="utf-8"?>
-<p:tagLst xmlns:a="http://schemas.openxmlformats.org/drawingml/2006/main" xmlns:r="http://schemas.openxmlformats.org/officeDocument/2006/relationships" xmlns:p="http://schemas.openxmlformats.org/presentationml/2006/main">
-  <p:tag name="OUTPUTDPI" val="2000"/>
-  <p:tag name="ORIGINALHEIGHT" val="180.7274"/>
-  <p:tag name="ORIGINALWIDTH" val="164.2294"/>
-  <p:tag name="LATEXADDIN" val="\documentclass{article}&#10;\usepackage{amsmath}&#10;\pagestyle{empty}&#10;\usepackage{bm}&#10;\usepackage{xcolor}&#10;\newcommand{\pmeas}{{\bf p}}&#10;\newcommand{\umeas}{{\bf u}}&#10;\newcommand{\ymeas}{{\bf y}}&#10;\newcommand{\yo}{{\bf y}^{\rm o} }&#10;&#10;\newcommand{\nin}{n_u} &#10;\newcommand{\ny}{n_y} &#10;\newcommand{\nx}{n_x} &#10;\newcommand{\np}{n_p} &#10;\begin{document}&#10;&#10; \begin{align*}&#10; {\color{white}{\theta_3}}&#10; \end{align*}&#10;&#10;&#10;&#10;&#10;\end{document}"/>
   <p:tag name="IGUANATEXSIZE" val="24"/>
   <p:tag name="IGUANATEXCURSOR" val="373"/>
   <p:tag name="TRANSPARENCY" val="Vero"/>
@@ -29197,6 +29289,24 @@
 <file path=ppt/tags/tag30.xml><?xml version="1.0" encoding="utf-8"?>
 <p:tagLst xmlns:a="http://schemas.openxmlformats.org/drawingml/2006/main" xmlns:r="http://schemas.openxmlformats.org/officeDocument/2006/relationships" xmlns:p="http://schemas.openxmlformats.org/presentationml/2006/main">
   <p:tag name="OUTPUTDPI" val="2000"/>
+  <p:tag name="ORIGINALHEIGHT" val="180.7274"/>
+  <p:tag name="ORIGINALWIDTH" val="164.2294"/>
+  <p:tag name="LATEXADDIN" val="\documentclass{article}&#10;\usepackage{amsmath}&#10;\pagestyle{empty}&#10;\usepackage{bm}&#10;\usepackage{xcolor}&#10;\newcommand{\pmeas}{{\bf p}}&#10;\newcommand{\umeas}{{\bf u}}&#10;\newcommand{\ymeas}{{\bf y}}&#10;\newcommand{\yo}{{\bf y}^{\rm o} }&#10;&#10;\newcommand{\nin}{n_u} &#10;\newcommand{\ny}{n_y} &#10;\newcommand{\nx}{n_x} &#10;\newcommand{\np}{n_p} &#10;\begin{document}&#10;&#10; \begin{align*}&#10; {\color{white}{\theta_3}}&#10; \end{align*}&#10;&#10;&#10;&#10;&#10;\end{document}"/>
+  <p:tag name="IGUANATEXSIZE" val="24"/>
+  <p:tag name="IGUANATEXCURSOR" val="373"/>
+  <p:tag name="TRANSPARENCY" val="Vero"/>
+  <p:tag name="LATEXENGINEID" val="0"/>
+  <p:tag name="TEMPFOLDER" val="\\supsi.ch\DTI\HOME\dario.piga\Desktop\Testppt\temp\"/>
+  <p:tag name="LATEXFORMHEIGHT" val="312"/>
+  <p:tag name="LATEXFORMWIDTH" val="384"/>
+  <p:tag name="LATEXFORMWRAP" val="Vero"/>
+  <p:tag name="BITMAPVECTOR" val="0"/>
+</p:tagLst>
+</file>
+
+<file path=ppt/tags/tag31.xml><?xml version="1.0" encoding="utf-8"?>
+<p:tagLst xmlns:a="http://schemas.openxmlformats.org/drawingml/2006/main" xmlns:r="http://schemas.openxmlformats.org/officeDocument/2006/relationships" xmlns:p="http://schemas.openxmlformats.org/presentationml/2006/main">
+  <p:tag name="OUTPUTDPI" val="2000"/>
   <p:tag name="ORIGINALHEIGHT" val="435.6955"/>
   <p:tag name="ORIGINALWIDTH" val="807.649"/>
   <p:tag name="LATEXADDIN" val="\documentclass{article}&#10;\usepackage{amsmath}&#10;\pagestyle{empty}&#10;\usepackage{bm}&#10;\newcommand{\pmeas}{{\bf p}}&#10;\newcommand{\umeas}{{\bf u}}&#10;\newcommand{\ymeas}{{\bf y}}&#10;\newcommand{\yo}{{\bf y}^{\rm o} }&#10;&#10;\newcommand{\nin}{n_u} &#10;\newcommand{\ny}{n_y} &#10;\newcommand{\nx}{n_x} &#10;\newcommand{\np}{n_p} &#10;\begin{document}&#10;&#10; \begin{align*}&#10; \delta^3 = \frac{\partial \ell}{\partial z^3} &#10; \end{align*}&#10;&#10;&#10;&#10;&#10;\end{document}"/>
@@ -29212,7 +29322,7 @@
 </p:tagLst>
 </file>
 
-<file path=ppt/tags/tag31.xml><?xml version="1.0" encoding="utf-8"?>
+<file path=ppt/tags/tag32.xml><?xml version="1.0" encoding="utf-8"?>
 <p:tagLst xmlns:a="http://schemas.openxmlformats.org/drawingml/2006/main" xmlns:r="http://schemas.openxmlformats.org/officeDocument/2006/relationships" xmlns:p="http://schemas.openxmlformats.org/presentationml/2006/main">
   <p:tag name="OUTPUTDPI" val="2000"/>
   <p:tag name="ORIGINALHEIGHT" val="435.6955"/>
@@ -29230,7 +29340,7 @@
 </p:tagLst>
 </file>
 
-<file path=ppt/tags/tag32.xml><?xml version="1.0" encoding="utf-8"?>
+<file path=ppt/tags/tag33.xml><?xml version="1.0" encoding="utf-8"?>
 <p:tagLst xmlns:a="http://schemas.openxmlformats.org/drawingml/2006/main" xmlns:r="http://schemas.openxmlformats.org/officeDocument/2006/relationships" xmlns:p="http://schemas.openxmlformats.org/presentationml/2006/main">
   <p:tag name="OUTPUTDPI" val="2000"/>
   <p:tag name="ORIGINALHEIGHT" val="435.6955"/>
@@ -29248,7 +29358,7 @@
 </p:tagLst>
 </file>
 
-<file path=ppt/tags/tag33.xml><?xml version="1.0" encoding="utf-8"?>
+<file path=ppt/tags/tag34.xml><?xml version="1.0" encoding="utf-8"?>
 <p:tagLst xmlns:a="http://schemas.openxmlformats.org/drawingml/2006/main" xmlns:r="http://schemas.openxmlformats.org/officeDocument/2006/relationships" xmlns:p="http://schemas.openxmlformats.org/presentationml/2006/main">
   <p:tag name="OUTPUTDPI" val="2000"/>
   <p:tag name="ORIGINALHEIGHT" val="177.7278"/>
@@ -29266,7 +29376,7 @@
 </p:tagLst>
 </file>
 
-<file path=ppt/tags/tag34.xml><?xml version="1.0" encoding="utf-8"?>
+<file path=ppt/tags/tag35.xml><?xml version="1.0" encoding="utf-8"?>
 <p:tagLst xmlns:a="http://schemas.openxmlformats.org/drawingml/2006/main" xmlns:r="http://schemas.openxmlformats.org/officeDocument/2006/relationships" xmlns:p="http://schemas.openxmlformats.org/presentationml/2006/main">
   <p:tag name="OUTPUTDPI" val="2000"/>
   <p:tag name="ORIGINALHEIGHT" val="435.6955"/>
@@ -29284,7 +29394,7 @@
 </p:tagLst>
 </file>
 
-<file path=ppt/tags/tag35.xml><?xml version="1.0" encoding="utf-8"?>
+<file path=ppt/tags/tag36.xml><?xml version="1.0" encoding="utf-8"?>
 <p:tagLst xmlns:a="http://schemas.openxmlformats.org/drawingml/2006/main" xmlns:r="http://schemas.openxmlformats.org/officeDocument/2006/relationships" xmlns:p="http://schemas.openxmlformats.org/presentationml/2006/main">
   <p:tag name="OUTPUTDPI" val="2000"/>
   <p:tag name="ORIGINALHEIGHT" val="435.6955"/>
@@ -29302,7 +29412,7 @@
 </p:tagLst>
 </file>
 
-<file path=ppt/tags/tag36.xml><?xml version="1.0" encoding="utf-8"?>
+<file path=ppt/tags/tag37.xml><?xml version="1.0" encoding="utf-8"?>
 <p:tagLst xmlns:a="http://schemas.openxmlformats.org/drawingml/2006/main" xmlns:r="http://schemas.openxmlformats.org/officeDocument/2006/relationships" xmlns:p="http://schemas.openxmlformats.org/presentationml/2006/main">
   <p:tag name="OUTPUTDPI" val="2000"/>
   <p:tag name="ORIGINALHEIGHT" val="186.7267"/>
@@ -29320,7 +29430,7 @@
 </p:tagLst>
 </file>
 
-<file path=ppt/tags/tag37.xml><?xml version="1.0" encoding="utf-8"?>
+<file path=ppt/tags/tag38.xml><?xml version="1.0" encoding="utf-8"?>
 <p:tagLst xmlns:a="http://schemas.openxmlformats.org/drawingml/2006/main" xmlns:r="http://schemas.openxmlformats.org/officeDocument/2006/relationships" xmlns:p="http://schemas.openxmlformats.org/presentationml/2006/main">
   <p:tag name="OUTPUTDPI" val="2000"/>
   <p:tag name="ORIGINALHEIGHT" val="236.2205"/>
@@ -29338,7 +29448,7 @@
 </p:tagLst>
 </file>
 
-<file path=ppt/tags/tag38.xml><?xml version="1.0" encoding="utf-8"?>
+<file path=ppt/tags/tag39.xml><?xml version="1.0" encoding="utf-8"?>
 <p:tagLst xmlns:a="http://schemas.openxmlformats.org/drawingml/2006/main" xmlns:r="http://schemas.openxmlformats.org/officeDocument/2006/relationships" xmlns:p="http://schemas.openxmlformats.org/presentationml/2006/main">
   <p:tag name="OUTPUTDPI" val="2000"/>
   <p:tag name="ORIGINALHEIGHT" val="462.6921"/>
@@ -29356,32 +29466,14 @@
 </p:tagLst>
 </file>
 
-<file path=ppt/tags/tag39.xml><?xml version="1.0" encoding="utf-8"?>
-<p:tagLst xmlns:a="http://schemas.openxmlformats.org/drawingml/2006/main" xmlns:r="http://schemas.openxmlformats.org/officeDocument/2006/relationships" xmlns:p="http://schemas.openxmlformats.org/presentationml/2006/main">
-  <p:tag name="OUTPUTDPI" val="2000"/>
-  <p:tag name="ORIGINALHEIGHT" val="521.9348"/>
-  <p:tag name="ORIGINALWIDTH" val="3692.539"/>
-  <p:tag name="LATEXADDIN" val="\documentclass{article}&#10;\usepackage{amsmath}&#10;\pagestyle{empty}&#10;\usepackage{bm}&#10;\newcommand{\pmeas}{{\bf p}}&#10;\newcommand{\umeas}{{\bf u}}&#10;\newcommand{\ymeas}{{\bf y}}&#10;\newcommand{\yo}{{\bf y}^{\rm o} }&#10;&#10;\newcommand{\nin}{n_u} &#10;\newcommand{\ny}{n_y} &#10;\newcommand{\nx}{n_x} &#10;\newcommand{\np}{n_p} &#10;\begin{document}&#10;&#10; \begin{align*}&#10; \delta_i^L = \frac{\partial \ell}{\partial z_i^{L}} =   \frac{\partial \ell}{\partial z^{L+1}}  \frac{\partial z^{L+1}}{\partial z_i^{L}} =   \delta^{L+1}   \frac{\partial z^{L+1}}{\partial z_i^{L}}&#10; \end{align*}&#10;&#10;&#10;&#10;&#10;\end{document}"/>
-  <p:tag name="IGUANATEXSIZE" val="16"/>
-  <p:tag name="IGUANATEXCURSOR" val="486"/>
-  <p:tag name="TRANSPARENCY" val="Vero"/>
-  <p:tag name="LATEXENGINEID" val="0"/>
-  <p:tag name="TEMPFOLDER" val="\\supsi.ch\DTI\HOME\dario.piga\Desktop\Testppt\temp\"/>
-  <p:tag name="LATEXFORMHEIGHT" val="312"/>
-  <p:tag name="LATEXFORMWIDTH" val="384"/>
-  <p:tag name="LATEXFORMWRAP" val="Vero"/>
-  <p:tag name="BITMAPVECTOR" val="0"/>
-</p:tagLst>
-</file>
-
 <file path=ppt/tags/tag4.xml><?xml version="1.0" encoding="utf-8"?>
 <p:tagLst xmlns:a="http://schemas.openxmlformats.org/drawingml/2006/main" xmlns:r="http://schemas.openxmlformats.org/officeDocument/2006/relationships" xmlns:p="http://schemas.openxmlformats.org/presentationml/2006/main">
   <p:tag name="OUTPUTDPI" val="2000"/>
-  <p:tag name="ORIGINALHEIGHT" val="234.7206"/>
-  <p:tag name="ORIGINALWIDTH" val="2503.187"/>
-  <p:tag name="LATEXADDIN" val="\documentclass{article}&#10;\usepackage{amsmath}&#10;\pagestyle{empty}&#10;\usepackage{bm}&#10;\usepackage{xcolor}&#10;\newcommand{\pmeas}{{\bf p}}&#10;\newcommand{\umeas}{{\bf u}}&#10;\newcommand{\ymeas}{{\bf y}}&#10;\newcommand{\yo}{{\bf y}^{\rm o} }&#10;&#10;\newcommand{\nin}{n_u} &#10;\newcommand{\ny}{n_y} &#10;\newcommand{\nx}{n_x} &#10;\newcommand{\np}{n_p} &#10;\definecolor{dyel}{RGB}{155,155,0}&#10;\definecolor{dgreen}{RGB}{0,100,0}&#10;\begin{document}&#10;&#10; \begin{align*}&#10;\textcolor{dyel}{y=z^4} = f(\textcolor{blue}{z^3}(\textcolor{dgreen}{z^2}(\textcolor{red}{z^1}));W,b) &#10; \end{align*}&#10;&#10;&#10;&#10;&#10;\end{document}"/>
+  <p:tag name="ORIGINALHEIGHT" val="557.9302"/>
+  <p:tag name="ORIGINALWIDTH" val="6077.24"/>
+  <p:tag name="LATEXADDIN" val="\documentclass{article}&#10;\usepackage{amsmath}&#10;\pagestyle{empty}&#10;\usepackage{bm}&#10;\usepackage{color}&#10;\newcommand{\pmeas}{{\bf p}}&#10;\newcommand{\umeas}{{\bf u}}&#10;\newcommand{\ymeas}{{\bf y}}&#10;\newcommand{\yo}{{\bf y}^{\rm o} }&#10;&#10;\newcommand{\nin}{n_u} &#10;\newcommand{\ny}{n_y} &#10;\newcommand{\nx}{n_x} &#10;\newcommand{\np}{n_p} &#10;\newcommand{\red}[1]{{\color{red}#1}}&#10;\usepackage{xcolor}&#10;\definecolor{dyel}{RGB}{155,155,0}&#10;\begin{document}&#10;&#10; \begin{align*}&#10; \textcolor{dyel}{\hat{y}(k)}   = &amp;  f\big(\underset{\textcolor{red}{z^1(k)}}{\underbrace{y(k-1),  \ldots, y(k-na), u(k),  u(k-1), \ldots,  u(k-nb)}}; W,b \big) &#10; \end{align*}&#10;&#10;&#10;&#10;&#10;\end{document}"/>
   <p:tag name="IGUANATEXSIZE" val="24"/>
-  <p:tag name="IGUANATEXCURSOR" val="481"/>
+  <p:tag name="IGUANATEXCURSOR" val="479"/>
   <p:tag name="TRANSPARENCY" val="Vero"/>
   <p:tag name="LATEXENGINEID" val="0"/>
   <p:tag name="TEMPFOLDER" val="\\supsi.ch\DTI\HOME\dario.piga\Desktop\Testppt\temp\"/>
@@ -29395,22 +29487,44 @@
 <file path=ppt/tags/tag40.xml><?xml version="1.0" encoding="utf-8"?>
 <p:tagLst xmlns:a="http://schemas.openxmlformats.org/drawingml/2006/main" xmlns:r="http://schemas.openxmlformats.org/officeDocument/2006/relationships" xmlns:p="http://schemas.openxmlformats.org/presentationml/2006/main">
   <p:tag name="OUTPUTDPI" val="2000"/>
-  <p:tag name="ORIGINALHEIGHT" val="589.4263"/>
-  <p:tag name="ORIGINALWIDTH" val="4014.248"/>
-  <p:tag name="LATEXADDIN" val="\documentclass{article}&#10;\usepackage{amsmath}&#10;\pagestyle{empty}&#10;\usepackage{bm}&#10;\newcommand{\pmeas}{{\bf p}}&#10;\newcommand{\umeas}{{\bf u}}&#10;\newcommand{\ymeas}{{\bf y}}&#10;\newcommand{\yo}{{\bf y}^{\rm o} }&#10;&#10;\newcommand{\nin}{n_u} &#10;\newcommand{\ny}{n_y} &#10;\newcommand{\nx}{n_x} &#10;\newcommand{\np}{n_p} &#10;\begin{document}&#10;&#10; \begin{align*}&#10;  \frac{\partial \ell}{\partial \theta_L} = \sum_{i=1}^{n_{L+1}}   \frac{\partial \ell}{\partial z_i^{L+1}}  \frac{\partial z_i^{L+1}}{\partial \theta_L} =  \sum_{i=1}^{n_{L+1}}\delta_i^{L+1}   \frac{\partial z_i^{L+1}}{\partial \theta_L}&#10; \end{align*}&#10;&#10;&#10;&#10;&#10;\end{document}"/>
+  <p:tag name="ORIGINALHEIGHT" val="22"/>
+  <p:tag name="ORIGINALWIDTH" val="145"/>
+  <p:tag name="OUTPUTTYPE" val="PDF"/>
+  <p:tag name="IGUANATEXVERSION" val="160"/>
+  <p:tag name="LATEXADDIN" val="\documentclass{article}&#10;\usepackage{amsmath}&#10;\pagestyle{empty}&#10;\usepackage{bm}&#10;\newcommand{\pmeas}{{\bf p}}&#10;\newcommand{\umeas}{{\bf u}}&#10;\newcommand{\ymeas}{{\bf y}}&#10;\newcommand{\yo}{{\bf y}^{\rm o} }&#10;&#10;\newcommand{\nin}{n_u} &#10;\newcommand{\ny}{n_y} &#10;\newcommand{\nx}{n_x} &#10;\newcommand{\np}{n_p} &#10;\begin{document}&#10;&#10; \begin{align*}&#10; \delta^L = \frac{\partial \ell}{\partial z^{L+1}}  \frac{\partial z^{L+1}}{\partial z^{L}} =   \delta^{L+1}   \frac{\partial z^{L+1}}{\partial z^{L}}&#10; \end{align*}&#10;&#10;&#10;&#10;&#10;\end{document}"/>
   <p:tag name="IGUANATEXSIZE" val="16"/>
-  <p:tag name="IGUANATEXCURSOR" val="505"/>
-  <p:tag name="TRANSPARENCY" val="Vero"/>
+  <p:tag name="IGUANATEXCURSOR" val="474"/>
+  <p:tag name="TRANSPARENCY" val="True"/>
   <p:tag name="LATEXENGINEID" val="0"/>
-  <p:tag name="TEMPFOLDER" val="\\supsi.ch\DTI\HOME\dario.piga\Desktop\Testppt\temp\"/>
+  <p:tag name="TEMPFOLDER" val="/Users/marco.forgione/Library/Containers/com.microsoft.Powerpoint/Data/tmp/TemporaryItems/"/>
   <p:tag name="LATEXFORMHEIGHT" val="312"/>
-  <p:tag name="LATEXFORMWIDTH" val="384"/>
-  <p:tag name="LATEXFORMWRAP" val="Vero"/>
+  <p:tag name="LATEXFORMWIDTH" val="504"/>
+  <p:tag name="LATEXFORMWRAP" val="True"/>
   <p:tag name="BITMAPVECTOR" val="0"/>
 </p:tagLst>
 </file>
 
 <file path=ppt/tags/tag41.xml><?xml version="1.0" encoding="utf-8"?>
+<p:tagLst xmlns:a="http://schemas.openxmlformats.org/drawingml/2006/main" xmlns:r="http://schemas.openxmlformats.org/officeDocument/2006/relationships" xmlns:p="http://schemas.openxmlformats.org/presentationml/2006/main">
+  <p:tag name="OUTPUTDPI" val="2000"/>
+  <p:tag name="ORIGINALHEIGHT" val="24"/>
+  <p:tag name="ORIGINALWIDTH" val="152"/>
+  <p:tag name="OUTPUTTYPE" val="PDF"/>
+  <p:tag name="IGUANATEXVERSION" val="160"/>
+  <p:tag name="LATEXADDIN" val="\documentclass{article}&#10;\usepackage{amsmath}&#10;\pagestyle{empty}&#10;\usepackage{bm}&#10;\newcommand{\pmeas}{{\bf p}}&#10;\newcommand{\umeas}{{\bf u}}&#10;\newcommand{\ymeas}{{\bf y}}&#10;\newcommand{\yo}{{\bf y}^{\rm o} }&#10;&#10;\newcommand{\nin}{n_u} &#10;\newcommand{\ny}{n_y} &#10;\newcommand{\nx}{n_x} &#10;\newcommand{\np}{n_p} &#10;\begin{document}&#10;&#10; \begin{align*}&#10;  \frac{\partial \ell}{\partial \theta_L} = &#10;\frac{\partial \ell}{\partial z^{L+1}}  \frac{\partial z^{L+1}}&#10;{\partial \theta_L} &#10;= \delta^{L+1} \frac{\partial z^{L+1}}{\partial \theta_L}&#10; \end{align*}&#10;&#10;&#10;&#10;&#10;\end{document}"/>
+  <p:tag name="IGUANATEXSIZE" val="16"/>
+  <p:tag name="IGUANATEXCURSOR" val="474"/>
+  <p:tag name="TRANSPARENCY" val="True"/>
+  <p:tag name="LATEXENGINEID" val="0"/>
+  <p:tag name="TEMPFOLDER" val="/Users/marco.forgione/Library/Containers/com.microsoft.Powerpoint/Data/tmp/TemporaryItems/"/>
+  <p:tag name="LATEXFORMHEIGHT" val="686"/>
+  <p:tag name="LATEXFORMWIDTH" val="1099"/>
+  <p:tag name="LATEXFORMWRAP" val="True"/>
+  <p:tag name="BITMAPVECTOR" val="0"/>
+</p:tagLst>
+</file>
+
+<file path=ppt/tags/tag42.xml><?xml version="1.0" encoding="utf-8"?>
 <p:tagLst xmlns:a="http://schemas.openxmlformats.org/drawingml/2006/main" xmlns:r="http://schemas.openxmlformats.org/officeDocument/2006/relationships" xmlns:p="http://schemas.openxmlformats.org/presentationml/2006/main">
   <p:tag name="OUTPUTDPI" val="2000"/>
   <p:tag name="ORIGINALHEIGHT" val="188.9764"/>
@@ -29428,7 +29542,7 @@
 </p:tagLst>
 </file>
 
-<file path=ppt/tags/tag42.xml><?xml version="1.0" encoding="utf-8"?>
+<file path=ppt/tags/tag43.xml><?xml version="1.0" encoding="utf-8"?>
 <p:tagLst xmlns:a="http://schemas.openxmlformats.org/drawingml/2006/main" xmlns:r="http://schemas.openxmlformats.org/officeDocument/2006/relationships" xmlns:p="http://schemas.openxmlformats.org/presentationml/2006/main">
   <p:tag name="OUTPUTDPI" val="2000"/>
   <p:tag name="ORIGINALHEIGHT" val="521.9348"/>
@@ -29446,43 +29560,47 @@
 </p:tagLst>
 </file>
 
-<file path=ppt/tags/tag43.xml><?xml version="1.0" encoding="utf-8"?>
-<p:tagLst xmlns:a="http://schemas.openxmlformats.org/drawingml/2006/main" xmlns:r="http://schemas.openxmlformats.org/officeDocument/2006/relationships" xmlns:p="http://schemas.openxmlformats.org/presentationml/2006/main">
-  <p:tag name="OUTPUTDPI" val="2000"/>
-  <p:tag name="ORIGINALHEIGHT" val="1121.11"/>
-  <p:tag name="ORIGINALWIDTH" val="3766.779"/>
-  <p:tag name="LATEXADDIN" val="\documentclass{article}&#10;\usepackage{amsmath}&#10;\pagestyle{empty}&#10;\usepackage{bm}&#10;\newcommand{\pmeas}{{\bf p}}&#10;\newcommand{\umeas}{{\bf u}}&#10;\newcommand{\ymeas}{{\bf y}}&#10;\newcommand{\yo}{{\bf y}^{\rm o} }&#10;&#10;\newcommand{\nin}{n_u} &#10;\newcommand{\ny}{n_y} &#10;\newcommand{\nx}{n_x} &#10;\newcommand{\np}{n_p} &#10;\begin{document}&#10;&#10; \begin{align*}&#10;  \frac{\partial z_i^{L+1}}{\partial W} = \left[\begin{array}{l}0 \\ \vdots \\ z^{L'} \\0 \end{array} \right] \rightarrow&#10;  \frac{\partial \ell}{\partial W}   =  \left[\begin{array}{l}\delta_1^{L+1}z^{L'} \\ \vdots \\ \delta_{n_L}^{L+1}z^{L'} \end{array} \right]&#10; \end{align*}&#10;&#10;&#10;&#10;&#10;\end{document}"/>
-  <p:tag name="IGUANATEXSIZE" val="16"/>
-  <p:tag name="IGUANATEXCURSOR" val="558"/>
-  <p:tag name="TRANSPARENCY" val="Vero"/>
-  <p:tag name="LATEXENGINEID" val="0"/>
-  <p:tag name="TEMPFOLDER" val="\\supsi.ch\DTI\HOME\dario.piga\Desktop\Testppt\temp\"/>
-  <p:tag name="LATEXFORMHEIGHT" val="312"/>
-  <p:tag name="LATEXFORMWIDTH" val="384"/>
-  <p:tag name="LATEXFORMWRAP" val="Vero"/>
-  <p:tag name="BITMAPVECTOR" val="0"/>
-</p:tagLst>
-</file>
-
 <file path=ppt/tags/tag5.xml><?xml version="1.0" encoding="utf-8"?>
 <p:tagLst xmlns:a="http://schemas.openxmlformats.org/drawingml/2006/main" xmlns:r="http://schemas.openxmlformats.org/officeDocument/2006/relationships" xmlns:p="http://schemas.openxmlformats.org/presentationml/2006/main">
-  <p:tag name="OUTPUTDPI" val="2000"/>
-  <p:tag name="ORIGINALHEIGHT" val="557.9302"/>
-  <p:tag name="ORIGINALWIDTH" val="6077.24"/>
-  <p:tag name="LATEXADDIN" val="\documentclass{article}&#10;\usepackage{amsmath}&#10;\pagestyle{empty}&#10;\usepackage{bm}&#10;\usepackage{color}&#10;\newcommand{\pmeas}{{\bf p}}&#10;\newcommand{\umeas}{{\bf u}}&#10;\newcommand{\ymeas}{{\bf y}}&#10;\newcommand{\yo}{{\bf y}^{\rm o} }&#10;&#10;\newcommand{\nin}{n_u} &#10;\newcommand{\ny}{n_y} &#10;\newcommand{\nx}{n_x} &#10;\newcommand{\np}{n_p} &#10;\newcommand{\red}[1]{{\color{red}#1}}&#10;\usepackage{xcolor}&#10;\definecolor{dyel}{RGB}{155,155,0}&#10;\begin{document}&#10;&#10; \begin{align*}&#10; \textcolor{dyel}{\hat{y}(k)}   = &amp;  f\big(\underset{\textcolor{red}{z^1(k)}}{\underbrace{y(k-1),  \ldots, y(k-na), u(k),  u(k-1), \ldots,  u(k-nb)}}; W,b \big) &#10; \end{align*}&#10;&#10;&#10;&#10;&#10;\end{document}"/>
-  <p:tag name="IGUANATEXSIZE" val="24"/>
-  <p:tag name="IGUANATEXCURSOR" val="479"/>
-  <p:tag name="TRANSPARENCY" val="Vero"/>
+  <p:tag name="OUTPUTDPI" val="1200"/>
+  <p:tag name="ORIGINALHEIGHT" val="12"/>
+  <p:tag name="ORIGINALWIDTH" val="195"/>
+  <p:tag name="OUTPUTTYPE" val="PDF"/>
+  <p:tag name="IGUANATEXVERSION" val="160"/>
+  <p:tag name="LATEXADDIN" val="\documentclass{article}&#10;\usepackage{amsmath}&#10;\usepackage{amsfonts}&#10;\usepackage{color}&#10;\newcommand{\red}[1]{{\color{red}#1}}&#10;&#10;\pagestyle{empty}&#10;&#10;\begin{document}&#10;&#10;Overall: $y = W_3\sigma\big(W_2\sigma(W_1 x + b_1)+b_2\big) + b_3$&#10;&#10;\end{document}"/>
+  <p:tag name="IGUANATEXSIZE" val="18"/>
+  <p:tag name="IGUANATEXCURSOR" val="220"/>
+  <p:tag name="TRANSPARENCY" val="True"/>
   <p:tag name="LATEXENGINEID" val="0"/>
-  <p:tag name="TEMPFOLDER" val="\\supsi.ch\DTI\HOME\dario.piga\Desktop\Testppt\temp\"/>
-  <p:tag name="LATEXFORMHEIGHT" val="312"/>
-  <p:tag name="LATEXFORMWIDTH" val="384"/>
-  <p:tag name="LATEXFORMWRAP" val="Vero"/>
+  <p:tag name="TEMPFOLDER" val="/Users/marco.forgione/Library/Containers/com.microsoft.Powerpoint/Data/tmp/TemporaryItems/"/>
+  <p:tag name="LATEXFORMHEIGHT" val="426.65"/>
+  <p:tag name="LATEXFORMWIDTH" val="513.35"/>
+  <p:tag name="LATEXFORMWRAP" val="True"/>
   <p:tag name="BITMAPVECTOR" val="0"/>
 </p:tagLst>
 </file>
 
 <file path=ppt/tags/tag6.xml><?xml version="1.0" encoding="utf-8"?>
+<p:tagLst xmlns:a="http://schemas.openxmlformats.org/drawingml/2006/main" xmlns:r="http://schemas.openxmlformats.org/officeDocument/2006/relationships" xmlns:p="http://schemas.openxmlformats.org/presentationml/2006/main">
+  <p:tag name="OUTPUTDPI" val="1200"/>
+  <p:tag name="ORIGINALHEIGHT" val="9"/>
+  <p:tag name="ORIGINALWIDTH" val="27"/>
+  <p:tag name="OUTPUTTYPE" val="PDF"/>
+  <p:tag name="IGUANATEXVERSION" val="160"/>
+  <p:tag name="LATEXADDIN" val="\documentclass{article}&#10;\usepackage{amsmath}&#10;\usepackage{amsfonts}&#10;\usepackage{color}&#10;\newcommand{\red}[1]{{\color{red}#1}}&#10;&#10;\pagestyle{empty}&#10;&#10;\begin{document}&#10;&#10;$$&#10;x = z^1&#10;$$&#10;&#10;\end{document}"/>
+  <p:tag name="IGUANATEXSIZE" val="18"/>
+  <p:tag name="IGUANATEXCURSOR" val="172"/>
+  <p:tag name="TRANSPARENCY" val="True"/>
+  <p:tag name="LATEXENGINEID" val="0"/>
+  <p:tag name="TEMPFOLDER" val="/Users/marco.forgione/Library/Containers/com.microsoft.Powerpoint/Data/tmp/TemporaryItems/"/>
+  <p:tag name="LATEXFORMHEIGHT" val="426.65"/>
+  <p:tag name="LATEXFORMWIDTH" val="513.35"/>
+  <p:tag name="LATEXFORMWRAP" val="True"/>
+  <p:tag name="BITMAPVECTOR" val="0"/>
+</p:tagLst>
+</file>
+
+<file path=ppt/tags/tag7.xml><?xml version="1.0" encoding="utf-8"?>
 <p:tagLst xmlns:a="http://schemas.openxmlformats.org/drawingml/2006/main" xmlns:r="http://schemas.openxmlformats.org/officeDocument/2006/relationships" xmlns:p="http://schemas.openxmlformats.org/presentationml/2006/main">
   <p:tag name="OUTPUTDPI" val="2000"/>
   <p:tag name="ORIGINALHEIGHT" val="216.7229"/>
@@ -29500,16 +29618,16 @@
 </p:tagLst>
 </file>
 
-<file path=ppt/tags/tag7.xml><?xml version="1.0" encoding="utf-8"?>
+<file path=ppt/tags/tag8.xml><?xml version="1.0" encoding="utf-8"?>
 <p:tagLst xmlns:a="http://schemas.openxmlformats.org/drawingml/2006/main" xmlns:r="http://schemas.openxmlformats.org/officeDocument/2006/relationships" xmlns:p="http://schemas.openxmlformats.org/presentationml/2006/main">
   <p:tag name="OUTPUTDPI" val="2000"/>
   <p:tag name="ORIGINALHEIGHT" val="11"/>
-  <p:tag name="ORIGINALWIDTH" val="90"/>
+  <p:tag name="ORIGINALWIDTH" val="77"/>
   <p:tag name="OUTPUTTYPE" val="PDF"/>
   <p:tag name="IGUANATEXVERSION" val="160"/>
-  <p:tag name="LATEXADDIN" val="\documentclass{article}&#10;\usepackage{amsmath}&#10;\pagestyle{empty}&#10;\usepackage{bm}&#10;\usepackage{color}&#10;\newcommand{\pmeas}{{\bf p}}&#10;\newcommand{\umeas}{{\bf u}}&#10;\newcommand{\ymeas}{{\bf y}}&#10;\newcommand{\yo}{{\bf y}^{\rm o} }&#10;&#10;\newcommand{\nin}{n_u} &#10;\newcommand{\ny}{n_y} &#10;\newcommand{\nx}{n_x} &#10;\newcommand{\np}{n_p} &#10;\newcommand{\red}[1]{{\color{red}#1}}&#10;\usepackage{xcolor}&#10;\definecolor{dyel}{RGB}{155,155,0}&#10;\begin{document}&#10;&#10; \begin{align*}&#10; \hat{y}(t) = \red{W_{ho}} h(t)  + \red{b_{hy}}&#10; \end{align*}&#10;&#10;&#10;&#10;&#10;\end{document}"/>
+  <p:tag name="LATEXADDIN" val="\documentclass{article}&#10;\usepackage{amsmath}&#10;\pagestyle{empty}&#10;\usepackage{bm}&#10;\usepackage{color}&#10;\newcommand{\pmeas}{{\bf p}}&#10;\newcommand{\umeas}{{\bf u}}&#10;\newcommand{\ymeas}{{\bf y}}&#10;\newcommand{\yo}{{\bf y}^{\rm o} }&#10;&#10;\newcommand{\nin}{n_u} &#10;\newcommand{\ny}{n_y} &#10;\newcommand{\nx}{n_x} &#10;\newcommand{\np}{n_p} &#10;\newcommand{\red}[1]{{\color{red}#1}}&#10;\usepackage{xcolor}&#10;\definecolor{dyel}{RGB}{155,155,0}&#10;\begin{document}&#10;&#10; \begin{align*}&#10; \hat{y}(t) = g(h(t); \red{W_g})&#10; \end{align*}&#10;&#10;&#10;&#10;&#10;\end{document}"/>
   <p:tag name="IGUANATEXSIZE" val="24"/>
-  <p:tag name="IGUANATEXCURSOR" val="461"/>
+  <p:tag name="IGUANATEXCURSOR" val="462"/>
   <p:tag name="TRANSPARENCY" val="True"/>
   <p:tag name="LATEXENGINEID" val="0"/>
   <p:tag name="TEMPFOLDER" val="/Users/marco.forgione/Library/Containers/com.microsoft.Powerpoint/Data/tmp/TemporaryItems/"/>
@@ -29520,7 +29638,7 @@
 </p:tagLst>
 </file>
 
-<file path=ppt/tags/tag8.xml><?xml version="1.0" encoding="utf-8"?>
+<file path=ppt/tags/tag9.xml><?xml version="1.0" encoding="utf-8"?>
 <p:tagLst xmlns:a="http://schemas.openxmlformats.org/drawingml/2006/main" xmlns:r="http://schemas.openxmlformats.org/officeDocument/2006/relationships" xmlns:p="http://schemas.openxmlformats.org/presentationml/2006/main">
   <p:tag name="OUTPUTDPI" val="2000"/>
   <p:tag name="ORIGINALHEIGHT" val="605.9243"/>
@@ -29528,24 +29646,6 @@
   <p:tag name="LATEXADDIN" val="\documentclass{article}&#10;\usepackage{amsmath}&#10;\pagestyle{empty}&#10;\usepackage{bm}&#10;\usepackage{color}&#10;\newcommand{\pmeas}{{\bf p}}&#10;\newcommand{\umeas}{{\bf u}}&#10;\newcommand{\ymeas}{{\bf y}}&#10;\newcommand{\yo}{{\bf y}^{\rm o} }&#10;&#10;\newcommand{\nin}{n_u} &#10;\newcommand{\ny}{n_y} &#10;\newcommand{\nx}{n_x} &#10;\newcommand{\np}{n_p} &#10;\newcommand{\red}[1]{{\color{red}#1}}&#10;\usepackage{xcolor}&#10;\definecolor{dyel}{RGB}{155,155,0}&#10;\begin{document}&#10;&#10; \begin{align*}&#10; \mathcal{L} = \sum_{i=0}^{T} \left\|\hat{y}(t+i) - y(t+i)\right\|^2&#10; \end{align*}&#10;&#10;&#10;&#10;&#10;\end{document}"/>
   <p:tag name="IGUANATEXSIZE" val="24"/>
   <p:tag name="IGUANATEXCURSOR" val="465"/>
-  <p:tag name="TRANSPARENCY" val="Vero"/>
-  <p:tag name="LATEXENGINEID" val="0"/>
-  <p:tag name="TEMPFOLDER" val="\\supsi.ch\DTI\HOME\dario.piga\Desktop\Testppt\temp\"/>
-  <p:tag name="LATEXFORMHEIGHT" val="312"/>
-  <p:tag name="LATEXFORMWIDTH" val="384"/>
-  <p:tag name="LATEXFORMWRAP" val="Vero"/>
-  <p:tag name="BITMAPVECTOR" val="0"/>
-</p:tagLst>
-</file>
-
-<file path=ppt/tags/tag9.xml><?xml version="1.0" encoding="utf-8"?>
-<p:tagLst xmlns:a="http://schemas.openxmlformats.org/drawingml/2006/main" xmlns:r="http://schemas.openxmlformats.org/officeDocument/2006/relationships" xmlns:p="http://schemas.openxmlformats.org/presentationml/2006/main">
-  <p:tag name="OUTPUTDPI" val="2000"/>
-  <p:tag name="ORIGINALHEIGHT" val="602.9246"/>
-  <p:tag name="ORIGINALWIDTH" val="2208.474"/>
-  <p:tag name="LATEXADDIN" val="\documentclass{article}&#10;\usepackage{amsmath}&#10;\pagestyle{empty}&#10;\usepackage{bm}&#10;\usepackage{color}&#10;\newcommand{\pmeas}{{\bf p}}&#10;\newcommand{\umeas}{{\bf u}}&#10;\newcommand{\ymeas}{{\bf y}}&#10;\newcommand{\yo}{{\bf y}^{\rm o} }&#10;&#10;\newcommand{\nin}{n_u} &#10;\newcommand{\ny}{n_y} &#10;\newcommand{\nx}{n_x} &#10;\newcommand{\np}{n_p} &#10;\newcommand{\red}[1]{{\color{red}#1}}&#10;\usepackage{xcolor}&#10;\definecolor{dyel}{RGB}{155,155,0}&#10;\begin{document}&#10;&#10; \begin{align*}&#10; \mathcal{L} = \frac{1}{T} \sum_{t=0}^{T} \left\|\hat{y}(t) - y(t)\right\|^2&#10; \end{align*}&#10;&#10;&#10;&#10;&#10;\end{document}"/>
-  <p:tag name="IGUANATEXSIZE" val="24"/>
-  <p:tag name="IGUANATEXCURSOR" val="477"/>
   <p:tag name="TRANSPARENCY" val="Vero"/>
   <p:tag name="LATEXENGINEID" val="0"/>
   <p:tag name="TEMPFOLDER" val="\\supsi.ch\DTI\HOME\dario.piga\Desktop\Testppt\temp\"/>

</xml_diff>